<commit_message>
Add test, data, evaluator
</commit_message>
<xml_diff>
--- a/Report.pptx
+++ b/Report.pptx
@@ -17,8 +17,8 @@
     <p:sldId id="267" r:id="rId11"/>
     <p:sldId id="268" r:id="rId12"/>
     <p:sldId id="269" r:id="rId13"/>
-    <p:sldId id="270" r:id="rId14"/>
-    <p:sldId id="272" r:id="rId15"/>
+    <p:sldId id="272" r:id="rId14"/>
+    <p:sldId id="270" r:id="rId15"/>
     <p:sldId id="271" r:id="rId16"/>
   </p:sldIdLst>
   <p:sldSz cx="12192000" cy="6858000"/>
@@ -273,7 +273,7 @@
           <a:p>
             <a:fld id="{0EB9CCF3-6B96-4B5A-B8AA-029BD9435F88}" type="datetimeFigureOut">
               <a:rPr lang="en-US" smtClean="0"/>
-              <a:t>03-Jul-25</a:t>
+              <a:t>17-Jul-25</a:t>
             </a:fld>
             <a:endParaRPr lang="en-US"/>
           </a:p>
@@ -471,7 +471,7 @@
           <a:p>
             <a:fld id="{0EB9CCF3-6B96-4B5A-B8AA-029BD9435F88}" type="datetimeFigureOut">
               <a:rPr lang="en-US" smtClean="0"/>
-              <a:t>03-Jul-25</a:t>
+              <a:t>17-Jul-25</a:t>
             </a:fld>
             <a:endParaRPr lang="en-US"/>
           </a:p>
@@ -679,7 +679,7 @@
           <a:p>
             <a:fld id="{0EB9CCF3-6B96-4B5A-B8AA-029BD9435F88}" type="datetimeFigureOut">
               <a:rPr lang="en-US" smtClean="0"/>
-              <a:t>03-Jul-25</a:t>
+              <a:t>17-Jul-25</a:t>
             </a:fld>
             <a:endParaRPr lang="en-US"/>
           </a:p>
@@ -877,7 +877,7 @@
           <a:p>
             <a:fld id="{0EB9CCF3-6B96-4B5A-B8AA-029BD9435F88}" type="datetimeFigureOut">
               <a:rPr lang="en-US" smtClean="0"/>
-              <a:t>03-Jul-25</a:t>
+              <a:t>17-Jul-25</a:t>
             </a:fld>
             <a:endParaRPr lang="en-US"/>
           </a:p>
@@ -1152,7 +1152,7 @@
           <a:p>
             <a:fld id="{0EB9CCF3-6B96-4B5A-B8AA-029BD9435F88}" type="datetimeFigureOut">
               <a:rPr lang="en-US" smtClean="0"/>
-              <a:t>03-Jul-25</a:t>
+              <a:t>17-Jul-25</a:t>
             </a:fld>
             <a:endParaRPr lang="en-US"/>
           </a:p>
@@ -1417,7 +1417,7 @@
           <a:p>
             <a:fld id="{0EB9CCF3-6B96-4B5A-B8AA-029BD9435F88}" type="datetimeFigureOut">
               <a:rPr lang="en-US" smtClean="0"/>
-              <a:t>03-Jul-25</a:t>
+              <a:t>17-Jul-25</a:t>
             </a:fld>
             <a:endParaRPr lang="en-US"/>
           </a:p>
@@ -1829,7 +1829,7 @@
           <a:p>
             <a:fld id="{0EB9CCF3-6B96-4B5A-B8AA-029BD9435F88}" type="datetimeFigureOut">
               <a:rPr lang="en-US" smtClean="0"/>
-              <a:t>03-Jul-25</a:t>
+              <a:t>17-Jul-25</a:t>
             </a:fld>
             <a:endParaRPr lang="en-US"/>
           </a:p>
@@ -1970,7 +1970,7 @@
           <a:p>
             <a:fld id="{0EB9CCF3-6B96-4B5A-B8AA-029BD9435F88}" type="datetimeFigureOut">
               <a:rPr lang="en-US" smtClean="0"/>
-              <a:t>03-Jul-25</a:t>
+              <a:t>17-Jul-25</a:t>
             </a:fld>
             <a:endParaRPr lang="en-US"/>
           </a:p>
@@ -2083,7 +2083,7 @@
           <a:p>
             <a:fld id="{0EB9CCF3-6B96-4B5A-B8AA-029BD9435F88}" type="datetimeFigureOut">
               <a:rPr lang="en-US" smtClean="0"/>
-              <a:t>03-Jul-25</a:t>
+              <a:t>17-Jul-25</a:t>
             </a:fld>
             <a:endParaRPr lang="en-US"/>
           </a:p>
@@ -2394,7 +2394,7 @@
           <a:p>
             <a:fld id="{0EB9CCF3-6B96-4B5A-B8AA-029BD9435F88}" type="datetimeFigureOut">
               <a:rPr lang="en-US" smtClean="0"/>
-              <a:t>03-Jul-25</a:t>
+              <a:t>17-Jul-25</a:t>
             </a:fld>
             <a:endParaRPr lang="en-US"/>
           </a:p>
@@ -2682,7 +2682,7 @@
           <a:p>
             <a:fld id="{0EB9CCF3-6B96-4B5A-B8AA-029BD9435F88}" type="datetimeFigureOut">
               <a:rPr lang="en-US" smtClean="0"/>
-              <a:t>03-Jul-25</a:t>
+              <a:t>17-Jul-25</a:t>
             </a:fld>
             <a:endParaRPr lang="en-US"/>
           </a:p>
@@ -2923,7 +2923,7 @@
           <a:p>
             <a:fld id="{0EB9CCF3-6B96-4B5A-B8AA-029BD9435F88}" type="datetimeFigureOut">
               <a:rPr lang="en-US" smtClean="0"/>
-              <a:t>03-Jul-25</a:t>
+              <a:t>17-Jul-25</a:t>
             </a:fld>
             <a:endParaRPr lang="en-US"/>
           </a:p>
@@ -5757,474 +5757,6 @@
         <p:cNvPr id="1" name="">
           <a:extLst>
             <a:ext uri="{FF2B5EF4-FFF2-40B4-BE49-F238E27FC236}">
-              <a16:creationId xmlns:a16="http://schemas.microsoft.com/office/drawing/2014/main" id="{C611FD2A-E230-2195-BA34-AE83B163316D}"/>
-            </a:ext>
-          </a:extLst>
-        </p:cNvPr>
-        <p:cNvGrpSpPr/>
-        <p:nvPr/>
-      </p:nvGrpSpPr>
-      <p:grpSpPr>
-        <a:xfrm>
-          <a:off x="0" y="0"/>
-          <a:ext cx="0" cy="0"/>
-          <a:chOff x="0" y="0"/>
-          <a:chExt cx="0" cy="0"/>
-        </a:xfrm>
-      </p:grpSpPr>
-      <p:sp useBgFill="1">
-        <p:nvSpPr>
-          <p:cNvPr id="10" name="Rectangle 9">
-            <a:extLst>
-              <a:ext uri="{FF2B5EF4-FFF2-40B4-BE49-F238E27FC236}">
-                <a16:creationId xmlns:a16="http://schemas.microsoft.com/office/drawing/2014/main" id="{23A03BF6-E8EC-3E43-F147-810BB4C769F7}"/>
-              </a:ext>
-              <a:ext uri="{C183D7F6-B498-43B3-948B-1728B52AA6E4}">
-                <adec:decorative xmlns:adec="http://schemas.microsoft.com/office/drawing/2017/decorative" val="1"/>
-              </a:ext>
-            </a:extLst>
-          </p:cNvPr>
-          <p:cNvSpPr>
-            <a:spLocks noGrp="1" noRot="1" noChangeAspect="1" noMove="1" noResize="1" noEditPoints="1" noAdjustHandles="1" noChangeArrowheads="1" noChangeShapeType="1" noTextEdit="1"/>
-          </p:cNvSpPr>
-          <p:nvPr>
-            <p:extLst>
-              <p:ext uri="{386F3935-93C4-4BCD-93E2-E3B085C9AB24}">
-                <p16:designElem xmlns:p16="http://schemas.microsoft.com/office/powerpoint/2015/main" val="1"/>
-              </p:ext>
-            </p:extLst>
-          </p:nvPr>
-        </p:nvSpPr>
-        <p:spPr>
-          <a:xfrm>
-            <a:off x="0" y="0"/>
-            <a:ext cx="12191999" cy="6857365"/>
-          </a:xfrm>
-          <a:prstGeom prst="rect">
-            <a:avLst/>
-          </a:prstGeom>
-          <a:ln>
-            <a:noFill/>
-          </a:ln>
-        </p:spPr>
-        <p:style>
-          <a:lnRef idx="2">
-            <a:schemeClr val="accent1">
-              <a:shade val="50000"/>
-            </a:schemeClr>
-          </a:lnRef>
-          <a:fillRef idx="1">
-            <a:schemeClr val="accent1"/>
-          </a:fillRef>
-          <a:effectRef idx="0">
-            <a:schemeClr val="accent1"/>
-          </a:effectRef>
-          <a:fontRef idx="minor">
-            <a:schemeClr val="lt1"/>
-          </a:fontRef>
-        </p:style>
-        <p:txBody>
-          <a:bodyPr rtlCol="0" anchor="ctr"/>
-          <a:lstStyle/>
-          <a:p>
-            <a:pPr algn="ctr"/>
-            <a:endParaRPr lang="en-US"/>
-          </a:p>
-        </p:txBody>
-      </p:sp>
-      <p:sp>
-        <p:nvSpPr>
-          <p:cNvPr id="2" name="Title 1">
-            <a:extLst>
-              <a:ext uri="{FF2B5EF4-FFF2-40B4-BE49-F238E27FC236}">
-                <a16:creationId xmlns:a16="http://schemas.microsoft.com/office/drawing/2014/main" id="{0EC14509-C9F2-BE6A-A707-A90442699E87}"/>
-              </a:ext>
-            </a:extLst>
-          </p:cNvPr>
-          <p:cNvSpPr>
-            <a:spLocks noGrp="1"/>
-          </p:cNvSpPr>
-          <p:nvPr>
-            <p:ph type="title"/>
-          </p:nvPr>
-        </p:nvSpPr>
-        <p:spPr>
-          <a:xfrm>
-            <a:off x="523578" y="235974"/>
-            <a:ext cx="10859784" cy="1012758"/>
-          </a:xfrm>
-        </p:spPr>
-        <p:txBody>
-          <a:bodyPr anchor="b">
-            <a:normAutofit/>
-          </a:bodyPr>
-          <a:lstStyle/>
-          <a:p>
-            <a:pPr algn="ctr"/>
-            <a:r>
-              <a:rPr lang="en-US" sz="2800" b="1" dirty="0">
-                <a:solidFill>
-                  <a:schemeClr val="tx2">
-                    <a:lumMod val="75000"/>
-                    <a:lumOff val="25000"/>
-                  </a:schemeClr>
-                </a:solidFill>
-              </a:rPr>
-              <a:t>Work Progress Report</a:t>
-            </a:r>
-            <a:endParaRPr lang="en-US" sz="4800" b="1" dirty="0">
-              <a:solidFill>
-                <a:schemeClr val="tx2">
-                  <a:lumMod val="75000"/>
-                  <a:lumOff val="25000"/>
-                </a:schemeClr>
-              </a:solidFill>
-            </a:endParaRPr>
-          </a:p>
-        </p:txBody>
-      </p:sp>
-      <p:sp>
-        <p:nvSpPr>
-          <p:cNvPr id="12" name="Rectangle 11">
-            <a:extLst>
-              <a:ext uri="{FF2B5EF4-FFF2-40B4-BE49-F238E27FC236}">
-                <a16:creationId xmlns:a16="http://schemas.microsoft.com/office/drawing/2014/main" id="{A20EEC8B-82CD-97D5-8677-81B48495A3C4}"/>
-              </a:ext>
-              <a:ext uri="{C183D7F6-B498-43B3-948B-1728B52AA6E4}">
-                <adec:decorative xmlns:adec="http://schemas.microsoft.com/office/drawing/2017/decorative" val="1"/>
-              </a:ext>
-            </a:extLst>
-          </p:cNvPr>
-          <p:cNvSpPr>
-            <a:spLocks noGrp="1" noRot="1" noChangeAspect="1" noMove="1" noResize="1" noEditPoints="1" noAdjustHandles="1" noChangeArrowheads="1" noChangeShapeType="1" noTextEdit="1"/>
-          </p:cNvSpPr>
-          <p:nvPr>
-            <p:extLst>
-              <p:ext uri="{386F3935-93C4-4BCD-93E2-E3B085C9AB24}">
-                <p16:designElem xmlns:p16="http://schemas.microsoft.com/office/powerpoint/2015/main" val="1"/>
-              </p:ext>
-            </p:extLst>
-          </p:nvPr>
-        </p:nvSpPr>
-        <p:spPr>
-          <a:xfrm flipH="1" flipV="1">
-            <a:off x="-2" y="1998845"/>
-            <a:ext cx="11454595" cy="781699"/>
-          </a:xfrm>
-          <a:prstGeom prst="rect">
-            <a:avLst/>
-          </a:prstGeom>
-          <a:solidFill>
-            <a:schemeClr val="accent4"/>
-          </a:solidFill>
-          <a:ln>
-            <a:noFill/>
-          </a:ln>
-        </p:spPr>
-        <p:style>
-          <a:lnRef idx="2">
-            <a:schemeClr val="accent1">
-              <a:shade val="50000"/>
-            </a:schemeClr>
-          </a:lnRef>
-          <a:fillRef idx="1">
-            <a:schemeClr val="accent1"/>
-          </a:fillRef>
-          <a:effectRef idx="0">
-            <a:schemeClr val="accent1"/>
-          </a:effectRef>
-          <a:fontRef idx="minor">
-            <a:schemeClr val="lt1"/>
-          </a:fontRef>
-        </p:style>
-        <p:txBody>
-          <a:bodyPr rtlCol="0" anchor="ctr"/>
-          <a:lstStyle/>
-          <a:p>
-            <a:pPr algn="ctr"/>
-            <a:endParaRPr lang="en-US"/>
-          </a:p>
-        </p:txBody>
-      </p:sp>
-      <p:sp>
-        <p:nvSpPr>
-          <p:cNvPr id="14" name="Rectangle 13">
-            <a:extLst>
-              <a:ext uri="{FF2B5EF4-FFF2-40B4-BE49-F238E27FC236}">
-                <a16:creationId xmlns:a16="http://schemas.microsoft.com/office/drawing/2014/main" id="{5A24197C-2313-906B-143A-CAB93D5823C5}"/>
-              </a:ext>
-              <a:ext uri="{C183D7F6-B498-43B3-948B-1728B52AA6E4}">
-                <adec:decorative xmlns:adec="http://schemas.microsoft.com/office/drawing/2017/decorative" val="1"/>
-              </a:ext>
-            </a:extLst>
-          </p:cNvPr>
-          <p:cNvSpPr>
-            <a:spLocks noGrp="1" noRot="1" noChangeAspect="1" noMove="1" noResize="1" noEditPoints="1" noAdjustHandles="1" noChangeArrowheads="1" noChangeShapeType="1" noTextEdit="1"/>
-          </p:cNvSpPr>
-          <p:nvPr>
-            <p:extLst>
-              <p:ext uri="{386F3935-93C4-4BCD-93E2-E3B085C9AB24}">
-                <p16:designElem xmlns:p16="http://schemas.microsoft.com/office/powerpoint/2015/main" val="1"/>
-              </p:ext>
-            </p:extLst>
-          </p:nvPr>
-        </p:nvSpPr>
-        <p:spPr>
-          <a:xfrm>
-            <a:off x="0" y="2203079"/>
-            <a:ext cx="11383362" cy="4267991"/>
-          </a:xfrm>
-          <a:prstGeom prst="rect">
-            <a:avLst/>
-          </a:prstGeom>
-          <a:solidFill>
-            <a:schemeClr val="bg1"/>
-          </a:solidFill>
-          <a:ln>
-            <a:noFill/>
-          </a:ln>
-          <a:effectLst>
-            <a:outerShdw blurRad="139700" dist="127000" dir="5400000" algn="t" rotWithShape="0">
-              <a:prstClr val="black">
-                <a:alpha val="15000"/>
-              </a:prstClr>
-            </a:outerShdw>
-          </a:effectLst>
-        </p:spPr>
-        <p:style>
-          <a:lnRef idx="2">
-            <a:schemeClr val="accent1">
-              <a:shade val="50000"/>
-            </a:schemeClr>
-          </a:lnRef>
-          <a:fillRef idx="1">
-            <a:schemeClr val="accent1"/>
-          </a:fillRef>
-          <a:effectRef idx="0">
-            <a:schemeClr val="accent1"/>
-          </a:effectRef>
-          <a:fontRef idx="minor">
-            <a:schemeClr val="lt1"/>
-          </a:fontRef>
-        </p:style>
-        <p:txBody>
-          <a:bodyPr rtlCol="0" anchor="ctr"/>
-          <a:lstStyle/>
-          <a:p>
-            <a:pPr algn="ctr"/>
-            <a:endParaRPr lang="en-US"/>
-          </a:p>
-        </p:txBody>
-      </p:sp>
-      <p:sp>
-        <p:nvSpPr>
-          <p:cNvPr id="3" name="Content Placeholder 2">
-            <a:extLst>
-              <a:ext uri="{FF2B5EF4-FFF2-40B4-BE49-F238E27FC236}">
-                <a16:creationId xmlns:a16="http://schemas.microsoft.com/office/drawing/2014/main" id="{4E2DA21A-CE61-628A-D26C-769991572D5B}"/>
-              </a:ext>
-            </a:extLst>
-          </p:cNvPr>
-          <p:cNvSpPr>
-            <a:spLocks noGrp="1"/>
-          </p:cNvSpPr>
-          <p:nvPr>
-            <p:ph idx="1"/>
-          </p:nvPr>
-        </p:nvSpPr>
-        <p:spPr>
-          <a:xfrm>
-            <a:off x="1082688" y="2321788"/>
-            <a:ext cx="9377324" cy="4030572"/>
-          </a:xfrm>
-        </p:spPr>
-        <p:txBody>
-          <a:bodyPr anchor="ctr">
-            <a:normAutofit fontScale="92500" lnSpcReduction="20000"/>
-          </a:bodyPr>
-          <a:lstStyle/>
-          <a:p>
-            <a:pPr>
-              <a:lnSpc>
-                <a:spcPct val="200000"/>
-              </a:lnSpc>
-            </a:pPr>
-            <a:r>
-              <a:rPr lang="en-US" sz="2200" b="1" dirty="0"/>
-              <a:t>Script to convert Excel to Json (Done)</a:t>
-            </a:r>
-          </a:p>
-          <a:p>
-            <a:pPr>
-              <a:lnSpc>
-                <a:spcPct val="200000"/>
-              </a:lnSpc>
-            </a:pPr>
-            <a:r>
-              <a:rPr lang="en-US" sz="2200" b="1" dirty="0"/>
-              <a:t>Dataset  (100 tasks) --- Done</a:t>
-            </a:r>
-          </a:p>
-          <a:p>
-            <a:pPr>
-              <a:lnSpc>
-                <a:spcPct val="200000"/>
-              </a:lnSpc>
-            </a:pPr>
-            <a:r>
-              <a:rPr lang="en-US" sz="2200" b="1" dirty="0"/>
-              <a:t>Evaluation function –--- Done (under testing)</a:t>
-            </a:r>
-          </a:p>
-          <a:p>
-            <a:pPr>
-              <a:lnSpc>
-                <a:spcPct val="200000"/>
-              </a:lnSpc>
-            </a:pPr>
-            <a:r>
-              <a:rPr lang="en-US" sz="2200" b="1" dirty="0"/>
-              <a:t>Run agents --- (Browser Use / </a:t>
-            </a:r>
-            <a:r>
-              <a:rPr lang="en-US" sz="2200" b="1" dirty="0" err="1"/>
-              <a:t>HxAgent</a:t>
-            </a:r>
-            <a:r>
-              <a:rPr lang="en-US" sz="2200" b="1" dirty="0"/>
-              <a:t> with Open LLMs). </a:t>
-            </a:r>
-          </a:p>
-          <a:p>
-            <a:pPr>
-              <a:lnSpc>
-                <a:spcPct val="200000"/>
-              </a:lnSpc>
-            </a:pPr>
-            <a:r>
-              <a:rPr lang="en-US" sz="2200" b="1" dirty="0"/>
-              <a:t>Add more tasks</a:t>
-            </a:r>
-          </a:p>
-          <a:p>
-            <a:pPr>
-              <a:lnSpc>
-                <a:spcPct val="200000"/>
-              </a:lnSpc>
-            </a:pPr>
-            <a:r>
-              <a:rPr lang="en-US" sz="2200" b="1" dirty="0"/>
-              <a:t>LLMs (Gemini, </a:t>
-            </a:r>
-            <a:r>
-              <a:rPr lang="en-US" sz="2200" b="1" dirty="0" err="1"/>
-              <a:t>Huggingface</a:t>
-            </a:r>
-            <a:r>
-              <a:rPr lang="en-US" sz="2200" b="1" dirty="0"/>
-              <a:t>)</a:t>
-            </a:r>
-          </a:p>
-          <a:p>
-            <a:pPr marL="0" indent="0">
-              <a:buNone/>
-            </a:pPr>
-            <a:endParaRPr lang="en-US" sz="1800" b="1" dirty="0"/>
-          </a:p>
-        </p:txBody>
-      </p:sp>
-      <p:sp>
-        <p:nvSpPr>
-          <p:cNvPr id="16" name="Rectangle 15">
-            <a:extLst>
-              <a:ext uri="{FF2B5EF4-FFF2-40B4-BE49-F238E27FC236}">
-                <a16:creationId xmlns:a16="http://schemas.microsoft.com/office/drawing/2014/main" id="{E817A08D-E91C-4B91-5C8A-B173729D1A95}"/>
-              </a:ext>
-              <a:ext uri="{C183D7F6-B498-43B3-948B-1728B52AA6E4}">
-                <adec:decorative xmlns:adec="http://schemas.microsoft.com/office/drawing/2017/decorative" val="1"/>
-              </a:ext>
-            </a:extLst>
-          </p:cNvPr>
-          <p:cNvSpPr>
-            <a:spLocks noGrp="1" noRot="1" noChangeAspect="1" noMove="1" noResize="1" noEditPoints="1" noAdjustHandles="1" noChangeArrowheads="1" noChangeShapeType="1" noTextEdit="1"/>
-          </p:cNvSpPr>
-          <p:nvPr>
-            <p:extLst>
-              <p:ext uri="{386F3935-93C4-4BCD-93E2-E3B085C9AB24}">
-                <p16:designElem xmlns:p16="http://schemas.microsoft.com/office/powerpoint/2015/main" val="1"/>
-              </p:ext>
-            </p:extLst>
-          </p:nvPr>
-        </p:nvSpPr>
-        <p:spPr>
-          <a:xfrm rot="5400000">
-            <a:off x="11228040" y="2313027"/>
-            <a:ext cx="781700" cy="152382"/>
-          </a:xfrm>
-          <a:prstGeom prst="rect">
-            <a:avLst/>
-          </a:prstGeom>
-          <a:solidFill>
-            <a:schemeClr val="accent4"/>
-          </a:solidFill>
-          <a:ln>
-            <a:noFill/>
-          </a:ln>
-        </p:spPr>
-        <p:style>
-          <a:lnRef idx="2">
-            <a:schemeClr val="accent1">
-              <a:shade val="50000"/>
-            </a:schemeClr>
-          </a:lnRef>
-          <a:fillRef idx="1">
-            <a:schemeClr val="accent1"/>
-          </a:fillRef>
-          <a:effectRef idx="0">
-            <a:schemeClr val="accent1"/>
-          </a:effectRef>
-          <a:fontRef idx="minor">
-            <a:schemeClr val="lt1"/>
-          </a:fontRef>
-        </p:style>
-        <p:txBody>
-          <a:bodyPr rtlCol="0" anchor="ctr"/>
-          <a:lstStyle/>
-          <a:p>
-            <a:pPr algn="ctr"/>
-            <a:endParaRPr lang="en-US"/>
-          </a:p>
-        </p:txBody>
-      </p:sp>
-    </p:spTree>
-    <p:extLst>
-      <p:ext uri="{BB962C8B-B14F-4D97-AF65-F5344CB8AC3E}">
-        <p14:creationId xmlns:p14="http://schemas.microsoft.com/office/powerpoint/2010/main" val="1048080672"/>
-      </p:ext>
-    </p:extLst>
-  </p:cSld>
-  <p:clrMapOvr>
-    <a:masterClrMapping/>
-  </p:clrMapOvr>
-</p:sld>
-</file>
-
-<file path=ppt/slides/slide14.xml><?xml version="1.0" encoding="utf-8"?>
-<p:sld xmlns:a="http://schemas.openxmlformats.org/drawingml/2006/main" xmlns:r="http://schemas.openxmlformats.org/officeDocument/2006/relationships" xmlns:p="http://schemas.openxmlformats.org/presentationml/2006/main">
-  <p:cSld>
-    <p:bg>
-      <p:bgPr>
-        <a:solidFill>
-          <a:schemeClr val="bg1"/>
-        </a:solidFill>
-        <a:effectLst/>
-      </p:bgPr>
-    </p:bg>
-    <p:spTree>
-      <p:nvGrpSpPr>
-        <p:cNvPr id="1" name="">
-          <a:extLst>
-            <a:ext uri="{FF2B5EF4-FFF2-40B4-BE49-F238E27FC236}">
               <a16:creationId xmlns:a16="http://schemas.microsoft.com/office/drawing/2014/main" id="{CC3E9BFF-7577-C167-264D-4234A34135B2}"/>
             </a:ext>
           </a:extLst>
@@ -6374,14 +5906,14 @@
           <p:nvPr>
             <p:extLst>
               <p:ext uri="{D42A27DB-BD31-4B8C-83A1-F6EECF244321}">
-                <p14:modId xmlns:p14="http://schemas.microsoft.com/office/powerpoint/2010/main" val="3994993149"/>
+                <p14:modId xmlns:p14="http://schemas.microsoft.com/office/powerpoint/2010/main" val="1753899437"/>
               </p:ext>
             </p:extLst>
           </p:nvPr>
         </p:nvGraphicFramePr>
         <p:xfrm>
           <a:off x="673510" y="2138217"/>
-          <a:ext cx="10844979" cy="4134761"/>
+          <a:ext cx="10844979" cy="4333814"/>
         </p:xfrm>
         <a:graphic>
           <a:graphicData uri="http://schemas.openxmlformats.org/drawingml/2006/table">
@@ -6420,12 +5952,12 @@
                     <a:p>
                       <a:pPr algn="ctr" fontAlgn="ctr"/>
                       <a:r>
-                        <a:rPr lang="en-US" sz="2400" u="none" strike="noStrike">
+                        <a:rPr lang="en-US" sz="2400" u="none" strike="noStrike" dirty="0" err="1">
                           <a:effectLst/>
                         </a:rPr>
                         <a:t>eval_type</a:t>
                       </a:r>
-                      <a:endParaRPr lang="en-US" sz="2400" b="0" i="0" u="none" strike="noStrike">
+                      <a:endParaRPr lang="en-US" sz="2400" b="0" i="0" u="none" strike="noStrike" dirty="0">
                         <a:solidFill>
                           <a:srgbClr val="FFFFFF"/>
                         </a:solidFill>
@@ -6578,12 +6110,12 @@
                     <a:p>
                       <a:pPr lvl="1" algn="l" fontAlgn="ctr"/>
                       <a:r>
-                        <a:rPr lang="en-US" sz="2400" u="none" strike="noStrike">
+                        <a:rPr lang="en-US" sz="2400" u="none" strike="noStrike" dirty="0" err="1">
                           <a:effectLst/>
                         </a:rPr>
                         <a:t>regex_match</a:t>
                       </a:r>
-                      <a:endParaRPr lang="en-US" sz="2400" b="1" i="0" u="none" strike="noStrike">
+                      <a:endParaRPr lang="en-US" sz="2400" b="1" i="0" u="none" strike="noStrike" dirty="0">
                         <a:solidFill>
                           <a:srgbClr val="000000"/>
                         </a:solidFill>
@@ -6654,12 +6186,12 @@
                     <a:p>
                       <a:pPr lvl="1" algn="l" fontAlgn="ctr"/>
                       <a:r>
-                        <a:rPr lang="en-US" sz="2400" u="none" strike="noStrike">
+                        <a:rPr lang="en-US" sz="2400" u="none" strike="noStrike" dirty="0" err="1">
                           <a:effectLst/>
                         </a:rPr>
                         <a:t>url_match</a:t>
                       </a:r>
-                      <a:endParaRPr lang="en-US" sz="2400" b="1" i="0" u="none" strike="noStrike">
+                      <a:endParaRPr lang="en-US" sz="2400" b="1" i="0" u="none" strike="noStrike" dirty="0">
                         <a:solidFill>
                           <a:srgbClr val="000000"/>
                         </a:solidFill>
@@ -6728,7 +6260,7 @@
                   </a:ext>
                 </a:extLst>
               </a:tr>
-              <a:tr h="873303">
+              <a:tr h="933832">
                 <a:tc>
                   <a:txBody>
                     <a:bodyPr/>
@@ -6736,12 +6268,12 @@
                     <a:p>
                       <a:pPr lvl="1" algn="l" fontAlgn="ctr"/>
                       <a:r>
-                        <a:rPr lang="en-US" sz="2400" u="none" strike="noStrike">
+                        <a:rPr lang="en-US" sz="2400" u="none" strike="noStrike" dirty="0" err="1">
                           <a:effectLst/>
                         </a:rPr>
                         <a:t>dom_match</a:t>
                       </a:r>
-                      <a:endParaRPr lang="en-US" sz="2400" b="1" i="0" u="none" strike="noStrike">
+                      <a:endParaRPr lang="en-US" sz="2400" b="1" i="0" u="none" strike="noStrike" dirty="0">
                         <a:solidFill>
                           <a:srgbClr val="000000"/>
                         </a:solidFill>
@@ -6791,7 +6323,7 @@
                         <a:rPr lang="en-US" sz="2400" u="none" strike="noStrike" dirty="0">
                           <a:effectLst/>
                         </a:rPr>
-                        <a:t>exact | contains | semantic</a:t>
+                        <a:t>exact | contains </a:t>
                       </a:r>
                       <a:endParaRPr lang="en-US" sz="2400" b="0" i="0" u="none" strike="noStrike" dirty="0">
                         <a:solidFill>
@@ -6810,7 +6342,7 @@
                   </a:ext>
                 </a:extLst>
               </a:tr>
-              <a:tr h="477631">
+              <a:tr h="616155">
                 <a:tc>
                   <a:txBody>
                     <a:bodyPr/>
@@ -6818,7 +6350,7 @@
                     <a:p>
                       <a:pPr lvl="1" algn="l" fontAlgn="ctr"/>
                       <a:r>
-                        <a:rPr lang="en-US" sz="2400" u="none" strike="noStrike">
+                        <a:rPr lang="en-US" sz="2400" u="none" strike="noStrike" dirty="0" err="1">
                           <a:solidFill>
                             <a:schemeClr val="tx2">
                               <a:lumMod val="75000"/>
@@ -6829,7 +6361,7 @@
                         </a:rPr>
                         <a:t>list_match</a:t>
                       </a:r>
-                      <a:endParaRPr lang="en-US" sz="2400" b="1" i="0" u="none" strike="noStrike">
+                      <a:endParaRPr lang="en-US" sz="2400" b="1" i="0" u="none" strike="noStrike" dirty="0">
                         <a:solidFill>
                           <a:schemeClr val="tx2">
                             <a:lumMod val="75000"/>
@@ -6997,7 +6529,7 @@
 </p:sld>
 </file>
 
-<file path=ppt/slides/slide15.xml><?xml version="1.0" encoding="utf-8"?>
+<file path=ppt/slides/slide14.xml><?xml version="1.0" encoding="utf-8"?>
 <p:sld xmlns:a="http://schemas.openxmlformats.org/drawingml/2006/main" xmlns:r="http://schemas.openxmlformats.org/officeDocument/2006/relationships" xmlns:p="http://schemas.openxmlformats.org/presentationml/2006/main">
   <p:cSld>
     <p:bg>
@@ -7013,7 +6545,7 @@
         <p:cNvPr id="1" name="">
           <a:extLst>
             <a:ext uri="{FF2B5EF4-FFF2-40B4-BE49-F238E27FC236}">
-              <a16:creationId xmlns:a16="http://schemas.microsoft.com/office/drawing/2014/main" id="{C0BF8EFF-1776-2227-8972-A3633A6431FB}"/>
+              <a16:creationId xmlns:a16="http://schemas.microsoft.com/office/drawing/2014/main" id="{C611FD2A-E230-2195-BA34-AE83B163316D}"/>
             </a:ext>
           </a:extLst>
         </p:cNvPr>
@@ -7033,7 +6565,7 @@
           <p:cNvPr id="10" name="Rectangle 9">
             <a:extLst>
               <a:ext uri="{FF2B5EF4-FFF2-40B4-BE49-F238E27FC236}">
-                <a16:creationId xmlns:a16="http://schemas.microsoft.com/office/drawing/2014/main" id="{829B7C55-985C-DE85-19EF-0F8FB04C1771}"/>
+                <a16:creationId xmlns:a16="http://schemas.microsoft.com/office/drawing/2014/main" id="{23A03BF6-E8EC-3E43-F147-810BB4C769F7}"/>
               </a:ext>
               <a:ext uri="{C183D7F6-B498-43B3-948B-1728B52AA6E4}">
                 <adec:decorative xmlns:adec="http://schemas.microsoft.com/office/drawing/2017/decorative" val="1"/>
@@ -7093,7 +6625,7 @@
           <p:cNvPr id="2" name="Title 1">
             <a:extLst>
               <a:ext uri="{FF2B5EF4-FFF2-40B4-BE49-F238E27FC236}">
-                <a16:creationId xmlns:a16="http://schemas.microsoft.com/office/drawing/2014/main" id="{11B28754-2669-8930-CFA0-0953746854F6}"/>
+                <a16:creationId xmlns:a16="http://schemas.microsoft.com/office/drawing/2014/main" id="{0EC14509-C9F2-BE6A-A707-A90442699E87}"/>
               </a:ext>
             </a:extLst>
           </p:cNvPr>
@@ -7106,8 +6638,8 @@
         </p:nvSpPr>
         <p:spPr>
           <a:xfrm>
-            <a:off x="121742" y="386930"/>
-            <a:ext cx="10859784" cy="660205"/>
+            <a:off x="523578" y="235974"/>
+            <a:ext cx="10859784" cy="1012758"/>
           </a:xfrm>
         </p:spPr>
         <p:txBody>
@@ -7126,7 +6658,7 @@
                   </a:schemeClr>
                 </a:solidFill>
               </a:rPr>
-              <a:t>Challenges</a:t>
+              <a:t>Work Progress Report</a:t>
             </a:r>
             <a:endParaRPr lang="en-US" sz="4800" b="1" dirty="0">
               <a:solidFill>
@@ -7144,7 +6676,7 @@
           <p:cNvPr id="12" name="Rectangle 11">
             <a:extLst>
               <a:ext uri="{FF2B5EF4-FFF2-40B4-BE49-F238E27FC236}">
-                <a16:creationId xmlns:a16="http://schemas.microsoft.com/office/drawing/2014/main" id="{F194B296-EEF6-2108-816A-1B546C85EC92}"/>
+                <a16:creationId xmlns:a16="http://schemas.microsoft.com/office/drawing/2014/main" id="{A20EEC8B-82CD-97D5-8677-81B48495A3C4}"/>
               </a:ext>
               <a:ext uri="{C183D7F6-B498-43B3-948B-1728B52AA6E4}">
                 <adec:decorative xmlns:adec="http://schemas.microsoft.com/office/drawing/2017/decorative" val="1"/>
@@ -7207,7 +6739,7 @@
           <p:cNvPr id="14" name="Rectangle 13">
             <a:extLst>
               <a:ext uri="{FF2B5EF4-FFF2-40B4-BE49-F238E27FC236}">
-                <a16:creationId xmlns:a16="http://schemas.microsoft.com/office/drawing/2014/main" id="{EBDE1464-F996-241B-47FA-B2EA5E10541C}"/>
+                <a16:creationId xmlns:a16="http://schemas.microsoft.com/office/drawing/2014/main" id="{5A24197C-2313-906B-143A-CAB93D5823C5}"/>
               </a:ext>
               <a:ext uri="{C183D7F6-B498-43B3-948B-1728B52AA6E4}">
                 <adec:decorative xmlns:adec="http://schemas.microsoft.com/office/drawing/2017/decorative" val="1"/>
@@ -7277,6 +6809,509 @@
           <p:cNvPr id="3" name="Content Placeholder 2">
             <a:extLst>
               <a:ext uri="{FF2B5EF4-FFF2-40B4-BE49-F238E27FC236}">
+                <a16:creationId xmlns:a16="http://schemas.microsoft.com/office/drawing/2014/main" id="{4E2DA21A-CE61-628A-D26C-769991572D5B}"/>
+              </a:ext>
+            </a:extLst>
+          </p:cNvPr>
+          <p:cNvSpPr>
+            <a:spLocks noGrp="1"/>
+          </p:cNvSpPr>
+          <p:nvPr>
+            <p:ph idx="1"/>
+          </p:nvPr>
+        </p:nvSpPr>
+        <p:spPr>
+          <a:xfrm>
+            <a:off x="523579" y="2203078"/>
+            <a:ext cx="10859784" cy="4267991"/>
+          </a:xfrm>
+        </p:spPr>
+        <p:txBody>
+          <a:bodyPr anchor="ctr">
+            <a:normAutofit fontScale="77500" lnSpcReduction="20000"/>
+          </a:bodyPr>
+          <a:lstStyle/>
+          <a:p>
+            <a:pPr>
+              <a:lnSpc>
+                <a:spcPct val="200000"/>
+              </a:lnSpc>
+            </a:pPr>
+            <a:r>
+              <a:rPr lang="en-US" sz="2200" b="1" dirty="0"/>
+              <a:t>Environments (Magento, ERP, LMS, Redmine, </a:t>
+            </a:r>
+            <a:r>
+              <a:rPr lang="en-US" sz="2200" b="1" dirty="0" err="1"/>
+              <a:t>Wordpress</a:t>
+            </a:r>
+            <a:r>
+              <a:rPr lang="en-US" sz="2200" b="1" dirty="0"/>
+              <a:t>, Joomla, Drupal, Forums ) - Done</a:t>
+            </a:r>
+          </a:p>
+          <a:p>
+            <a:pPr>
+              <a:lnSpc>
+                <a:spcPct val="200000"/>
+              </a:lnSpc>
+            </a:pPr>
+            <a:r>
+              <a:rPr lang="en-US" sz="2200" b="1" dirty="0"/>
+              <a:t>Script to convert Excel to Json (Done)</a:t>
+            </a:r>
+          </a:p>
+          <a:p>
+            <a:pPr>
+              <a:lnSpc>
+                <a:spcPct val="200000"/>
+              </a:lnSpc>
+            </a:pPr>
+            <a:r>
+              <a:rPr lang="en-US" sz="2200" b="1" dirty="0"/>
+              <a:t>Dataset  (100 tasks) --- Done</a:t>
+            </a:r>
+          </a:p>
+          <a:p>
+            <a:pPr>
+              <a:lnSpc>
+                <a:spcPct val="200000"/>
+              </a:lnSpc>
+            </a:pPr>
+            <a:r>
+              <a:rPr lang="en-US" sz="2200" b="1" dirty="0"/>
+              <a:t>Evaluation function –--- Done</a:t>
+            </a:r>
+          </a:p>
+          <a:p>
+            <a:pPr>
+              <a:lnSpc>
+                <a:spcPct val="200000"/>
+              </a:lnSpc>
+            </a:pPr>
+            <a:r>
+              <a:rPr lang="en-US" sz="2200" b="1" dirty="0">
+                <a:solidFill>
+                  <a:srgbClr val="FF0000"/>
+                </a:solidFill>
+              </a:rPr>
+              <a:t>Run agents --- (Browser Use / </a:t>
+            </a:r>
+            <a:r>
+              <a:rPr lang="en-US" sz="2200" b="1" dirty="0" err="1">
+                <a:solidFill>
+                  <a:srgbClr val="FF0000"/>
+                </a:solidFill>
+              </a:rPr>
+              <a:t>HxAgent</a:t>
+            </a:r>
+            <a:r>
+              <a:rPr lang="en-US" sz="2200" b="1" dirty="0">
+                <a:solidFill>
+                  <a:srgbClr val="FF0000"/>
+                </a:solidFill>
+              </a:rPr>
+              <a:t> with Open LLMs). </a:t>
+            </a:r>
+          </a:p>
+          <a:p>
+            <a:pPr>
+              <a:lnSpc>
+                <a:spcPct val="200000"/>
+              </a:lnSpc>
+            </a:pPr>
+            <a:r>
+              <a:rPr lang="en-US" sz="2200" b="1" dirty="0">
+                <a:solidFill>
+                  <a:srgbClr val="FF0000"/>
+                </a:solidFill>
+              </a:rPr>
+              <a:t>Add more tasks – 300 tasks (planning)</a:t>
+            </a:r>
+          </a:p>
+          <a:p>
+            <a:pPr>
+              <a:lnSpc>
+                <a:spcPct val="200000"/>
+              </a:lnSpc>
+            </a:pPr>
+            <a:r>
+              <a:rPr lang="en-US" sz="2200" b="1" dirty="0"/>
+              <a:t>LLMs (Gemini, </a:t>
+            </a:r>
+            <a:r>
+              <a:rPr lang="en-US" sz="2200" b="1" dirty="0" err="1"/>
+              <a:t>Huggingface</a:t>
+            </a:r>
+            <a:r>
+              <a:rPr lang="en-US" sz="2200" b="1" dirty="0"/>
+              <a:t>)</a:t>
+            </a:r>
+          </a:p>
+          <a:p>
+            <a:pPr marL="0" indent="0">
+              <a:buNone/>
+            </a:pPr>
+            <a:endParaRPr lang="en-US" sz="1800" b="1" dirty="0"/>
+          </a:p>
+        </p:txBody>
+      </p:sp>
+      <p:sp>
+        <p:nvSpPr>
+          <p:cNvPr id="16" name="Rectangle 15">
+            <a:extLst>
+              <a:ext uri="{FF2B5EF4-FFF2-40B4-BE49-F238E27FC236}">
+                <a16:creationId xmlns:a16="http://schemas.microsoft.com/office/drawing/2014/main" id="{E817A08D-E91C-4B91-5C8A-B173729D1A95}"/>
+              </a:ext>
+              <a:ext uri="{C183D7F6-B498-43B3-948B-1728B52AA6E4}">
+                <adec:decorative xmlns:adec="http://schemas.microsoft.com/office/drawing/2017/decorative" val="1"/>
+              </a:ext>
+            </a:extLst>
+          </p:cNvPr>
+          <p:cNvSpPr>
+            <a:spLocks noGrp="1" noRot="1" noChangeAspect="1" noMove="1" noResize="1" noEditPoints="1" noAdjustHandles="1" noChangeArrowheads="1" noChangeShapeType="1" noTextEdit="1"/>
+          </p:cNvSpPr>
+          <p:nvPr>
+            <p:extLst>
+              <p:ext uri="{386F3935-93C4-4BCD-93E2-E3B085C9AB24}">
+                <p16:designElem xmlns:p16="http://schemas.microsoft.com/office/powerpoint/2015/main" val="1"/>
+              </p:ext>
+            </p:extLst>
+          </p:nvPr>
+        </p:nvSpPr>
+        <p:spPr>
+          <a:xfrm rot="5400000">
+            <a:off x="11228040" y="2313027"/>
+            <a:ext cx="781700" cy="152382"/>
+          </a:xfrm>
+          <a:prstGeom prst="rect">
+            <a:avLst/>
+          </a:prstGeom>
+          <a:solidFill>
+            <a:schemeClr val="accent4"/>
+          </a:solidFill>
+          <a:ln>
+            <a:noFill/>
+          </a:ln>
+        </p:spPr>
+        <p:style>
+          <a:lnRef idx="2">
+            <a:schemeClr val="accent1">
+              <a:shade val="50000"/>
+            </a:schemeClr>
+          </a:lnRef>
+          <a:fillRef idx="1">
+            <a:schemeClr val="accent1"/>
+          </a:fillRef>
+          <a:effectRef idx="0">
+            <a:schemeClr val="accent1"/>
+          </a:effectRef>
+          <a:fontRef idx="minor">
+            <a:schemeClr val="lt1"/>
+          </a:fontRef>
+        </p:style>
+        <p:txBody>
+          <a:bodyPr rtlCol="0" anchor="ctr"/>
+          <a:lstStyle/>
+          <a:p>
+            <a:pPr algn="ctr"/>
+            <a:endParaRPr lang="en-US"/>
+          </a:p>
+        </p:txBody>
+      </p:sp>
+    </p:spTree>
+    <p:extLst>
+      <p:ext uri="{BB962C8B-B14F-4D97-AF65-F5344CB8AC3E}">
+        <p14:creationId xmlns:p14="http://schemas.microsoft.com/office/powerpoint/2010/main" val="1048080672"/>
+      </p:ext>
+    </p:extLst>
+  </p:cSld>
+  <p:clrMapOvr>
+    <a:masterClrMapping/>
+  </p:clrMapOvr>
+</p:sld>
+</file>
+
+<file path=ppt/slides/slide15.xml><?xml version="1.0" encoding="utf-8"?>
+<p:sld xmlns:a="http://schemas.openxmlformats.org/drawingml/2006/main" xmlns:r="http://schemas.openxmlformats.org/officeDocument/2006/relationships" xmlns:p="http://schemas.openxmlformats.org/presentationml/2006/main">
+  <p:cSld>
+    <p:bg>
+      <p:bgPr>
+        <a:solidFill>
+          <a:schemeClr val="bg1"/>
+        </a:solidFill>
+        <a:effectLst/>
+      </p:bgPr>
+    </p:bg>
+    <p:spTree>
+      <p:nvGrpSpPr>
+        <p:cNvPr id="1" name="">
+          <a:extLst>
+            <a:ext uri="{FF2B5EF4-FFF2-40B4-BE49-F238E27FC236}">
+              <a16:creationId xmlns:a16="http://schemas.microsoft.com/office/drawing/2014/main" id="{C0BF8EFF-1776-2227-8972-A3633A6431FB}"/>
+            </a:ext>
+          </a:extLst>
+        </p:cNvPr>
+        <p:cNvGrpSpPr/>
+        <p:nvPr/>
+      </p:nvGrpSpPr>
+      <p:grpSpPr>
+        <a:xfrm>
+          <a:off x="0" y="0"/>
+          <a:ext cx="0" cy="0"/>
+          <a:chOff x="0" y="0"/>
+          <a:chExt cx="0" cy="0"/>
+        </a:xfrm>
+      </p:grpSpPr>
+      <p:sp useBgFill="1">
+        <p:nvSpPr>
+          <p:cNvPr id="10" name="Rectangle 9">
+            <a:extLst>
+              <a:ext uri="{FF2B5EF4-FFF2-40B4-BE49-F238E27FC236}">
+                <a16:creationId xmlns:a16="http://schemas.microsoft.com/office/drawing/2014/main" id="{829B7C55-985C-DE85-19EF-0F8FB04C1771}"/>
+              </a:ext>
+              <a:ext uri="{C183D7F6-B498-43B3-948B-1728B52AA6E4}">
+                <adec:decorative xmlns:adec="http://schemas.microsoft.com/office/drawing/2017/decorative" val="1"/>
+              </a:ext>
+            </a:extLst>
+          </p:cNvPr>
+          <p:cNvSpPr>
+            <a:spLocks noGrp="1" noRot="1" noChangeAspect="1" noMove="1" noResize="1" noEditPoints="1" noAdjustHandles="1" noChangeArrowheads="1" noChangeShapeType="1" noTextEdit="1"/>
+          </p:cNvSpPr>
+          <p:nvPr>
+            <p:extLst>
+              <p:ext uri="{386F3935-93C4-4BCD-93E2-E3B085C9AB24}">
+                <p16:designElem xmlns:p16="http://schemas.microsoft.com/office/powerpoint/2015/main" val="1"/>
+              </p:ext>
+            </p:extLst>
+          </p:nvPr>
+        </p:nvSpPr>
+        <p:spPr>
+          <a:xfrm>
+            <a:off x="0" y="0"/>
+            <a:ext cx="12191999" cy="6857365"/>
+          </a:xfrm>
+          <a:prstGeom prst="rect">
+            <a:avLst/>
+          </a:prstGeom>
+          <a:ln>
+            <a:noFill/>
+          </a:ln>
+        </p:spPr>
+        <p:style>
+          <a:lnRef idx="2">
+            <a:schemeClr val="accent1">
+              <a:shade val="50000"/>
+            </a:schemeClr>
+          </a:lnRef>
+          <a:fillRef idx="1">
+            <a:schemeClr val="accent1"/>
+          </a:fillRef>
+          <a:effectRef idx="0">
+            <a:schemeClr val="accent1"/>
+          </a:effectRef>
+          <a:fontRef idx="minor">
+            <a:schemeClr val="lt1"/>
+          </a:fontRef>
+        </p:style>
+        <p:txBody>
+          <a:bodyPr rtlCol="0" anchor="ctr"/>
+          <a:lstStyle/>
+          <a:p>
+            <a:pPr algn="ctr"/>
+            <a:endParaRPr lang="en-US"/>
+          </a:p>
+        </p:txBody>
+      </p:sp>
+      <p:sp>
+        <p:nvSpPr>
+          <p:cNvPr id="2" name="Title 1">
+            <a:extLst>
+              <a:ext uri="{FF2B5EF4-FFF2-40B4-BE49-F238E27FC236}">
+                <a16:creationId xmlns:a16="http://schemas.microsoft.com/office/drawing/2014/main" id="{11B28754-2669-8930-CFA0-0953746854F6}"/>
+              </a:ext>
+            </a:extLst>
+          </p:cNvPr>
+          <p:cNvSpPr>
+            <a:spLocks noGrp="1"/>
+          </p:cNvSpPr>
+          <p:nvPr>
+            <p:ph type="title"/>
+          </p:nvPr>
+        </p:nvSpPr>
+        <p:spPr>
+          <a:xfrm>
+            <a:off x="121742" y="386930"/>
+            <a:ext cx="10859784" cy="660205"/>
+          </a:xfrm>
+        </p:spPr>
+        <p:txBody>
+          <a:bodyPr anchor="b">
+            <a:normAutofit/>
+          </a:bodyPr>
+          <a:lstStyle/>
+          <a:p>
+            <a:pPr algn="ctr"/>
+            <a:r>
+              <a:rPr lang="en-US" sz="2800" b="1" dirty="0">
+                <a:solidFill>
+                  <a:schemeClr val="tx2">
+                    <a:lumMod val="75000"/>
+                    <a:lumOff val="25000"/>
+                  </a:schemeClr>
+                </a:solidFill>
+              </a:rPr>
+              <a:t>Challenges</a:t>
+            </a:r>
+            <a:endParaRPr lang="en-US" sz="4800" b="1" dirty="0">
+              <a:solidFill>
+                <a:schemeClr val="tx2">
+                  <a:lumMod val="75000"/>
+                  <a:lumOff val="25000"/>
+                </a:schemeClr>
+              </a:solidFill>
+            </a:endParaRPr>
+          </a:p>
+        </p:txBody>
+      </p:sp>
+      <p:sp>
+        <p:nvSpPr>
+          <p:cNvPr id="12" name="Rectangle 11">
+            <a:extLst>
+              <a:ext uri="{FF2B5EF4-FFF2-40B4-BE49-F238E27FC236}">
+                <a16:creationId xmlns:a16="http://schemas.microsoft.com/office/drawing/2014/main" id="{F194B296-EEF6-2108-816A-1B546C85EC92}"/>
+              </a:ext>
+              <a:ext uri="{C183D7F6-B498-43B3-948B-1728B52AA6E4}">
+                <adec:decorative xmlns:adec="http://schemas.microsoft.com/office/drawing/2017/decorative" val="1"/>
+              </a:ext>
+            </a:extLst>
+          </p:cNvPr>
+          <p:cNvSpPr>
+            <a:spLocks noGrp="1" noRot="1" noChangeAspect="1" noMove="1" noResize="1" noEditPoints="1" noAdjustHandles="1" noChangeArrowheads="1" noChangeShapeType="1" noTextEdit="1"/>
+          </p:cNvSpPr>
+          <p:nvPr>
+            <p:extLst>
+              <p:ext uri="{386F3935-93C4-4BCD-93E2-E3B085C9AB24}">
+                <p16:designElem xmlns:p16="http://schemas.microsoft.com/office/powerpoint/2015/main" val="1"/>
+              </p:ext>
+            </p:extLst>
+          </p:nvPr>
+        </p:nvSpPr>
+        <p:spPr>
+          <a:xfrm flipH="1" flipV="1">
+            <a:off x="-2" y="1998845"/>
+            <a:ext cx="11454595" cy="781699"/>
+          </a:xfrm>
+          <a:prstGeom prst="rect">
+            <a:avLst/>
+          </a:prstGeom>
+          <a:solidFill>
+            <a:schemeClr val="accent4"/>
+          </a:solidFill>
+          <a:ln>
+            <a:noFill/>
+          </a:ln>
+        </p:spPr>
+        <p:style>
+          <a:lnRef idx="2">
+            <a:schemeClr val="accent1">
+              <a:shade val="50000"/>
+            </a:schemeClr>
+          </a:lnRef>
+          <a:fillRef idx="1">
+            <a:schemeClr val="accent1"/>
+          </a:fillRef>
+          <a:effectRef idx="0">
+            <a:schemeClr val="accent1"/>
+          </a:effectRef>
+          <a:fontRef idx="minor">
+            <a:schemeClr val="lt1"/>
+          </a:fontRef>
+        </p:style>
+        <p:txBody>
+          <a:bodyPr rtlCol="0" anchor="ctr"/>
+          <a:lstStyle/>
+          <a:p>
+            <a:pPr algn="ctr"/>
+            <a:endParaRPr lang="en-US"/>
+          </a:p>
+        </p:txBody>
+      </p:sp>
+      <p:sp>
+        <p:nvSpPr>
+          <p:cNvPr id="14" name="Rectangle 13">
+            <a:extLst>
+              <a:ext uri="{FF2B5EF4-FFF2-40B4-BE49-F238E27FC236}">
+                <a16:creationId xmlns:a16="http://schemas.microsoft.com/office/drawing/2014/main" id="{EBDE1464-F996-241B-47FA-B2EA5E10541C}"/>
+              </a:ext>
+              <a:ext uri="{C183D7F6-B498-43B3-948B-1728B52AA6E4}">
+                <adec:decorative xmlns:adec="http://schemas.microsoft.com/office/drawing/2017/decorative" val="1"/>
+              </a:ext>
+            </a:extLst>
+          </p:cNvPr>
+          <p:cNvSpPr>
+            <a:spLocks noGrp="1" noRot="1" noChangeAspect="1" noMove="1" noResize="1" noEditPoints="1" noAdjustHandles="1" noChangeArrowheads="1" noChangeShapeType="1" noTextEdit="1"/>
+          </p:cNvSpPr>
+          <p:nvPr>
+            <p:extLst>
+              <p:ext uri="{386F3935-93C4-4BCD-93E2-E3B085C9AB24}">
+                <p16:designElem xmlns:p16="http://schemas.microsoft.com/office/powerpoint/2015/main" val="1"/>
+              </p:ext>
+            </p:extLst>
+          </p:nvPr>
+        </p:nvSpPr>
+        <p:spPr>
+          <a:xfrm>
+            <a:off x="0" y="2203079"/>
+            <a:ext cx="11383362" cy="4267991"/>
+          </a:xfrm>
+          <a:prstGeom prst="rect">
+            <a:avLst/>
+          </a:prstGeom>
+          <a:solidFill>
+            <a:schemeClr val="bg1"/>
+          </a:solidFill>
+          <a:ln>
+            <a:noFill/>
+          </a:ln>
+          <a:effectLst>
+            <a:outerShdw blurRad="139700" dist="127000" dir="5400000" algn="t" rotWithShape="0">
+              <a:prstClr val="black">
+                <a:alpha val="15000"/>
+              </a:prstClr>
+            </a:outerShdw>
+          </a:effectLst>
+        </p:spPr>
+        <p:style>
+          <a:lnRef idx="2">
+            <a:schemeClr val="accent1">
+              <a:shade val="50000"/>
+            </a:schemeClr>
+          </a:lnRef>
+          <a:fillRef idx="1">
+            <a:schemeClr val="accent1"/>
+          </a:fillRef>
+          <a:effectRef idx="0">
+            <a:schemeClr val="accent1"/>
+          </a:effectRef>
+          <a:fontRef idx="minor">
+            <a:schemeClr val="lt1"/>
+          </a:fontRef>
+        </p:style>
+        <p:txBody>
+          <a:bodyPr rtlCol="0" anchor="ctr"/>
+          <a:lstStyle/>
+          <a:p>
+            <a:pPr algn="ctr"/>
+            <a:endParaRPr lang="en-US"/>
+          </a:p>
+        </p:txBody>
+      </p:sp>
+      <p:sp>
+        <p:nvSpPr>
+          <p:cNvPr id="3" name="Content Placeholder 2">
+            <a:extLst>
+              <a:ext uri="{FF2B5EF4-FFF2-40B4-BE49-F238E27FC236}">
                 <a16:creationId xmlns:a16="http://schemas.microsoft.com/office/drawing/2014/main" id="{08638946-6238-2D73-9174-4BC7F0C685BC}"/>
               </a:ext>
             </a:extLst>
@@ -7307,7 +7342,7 @@
             </a:pPr>
             <a:r>
               <a:rPr lang="en-US" sz="2400" b="1" dirty="0"/>
-              <a:t>How to evaluate the Agent-generated data</a:t>
+              <a:t>Result (include extra data)</a:t>
             </a:r>
           </a:p>
           <a:p>
@@ -7318,7 +7353,43 @@
             </a:pPr>
             <a:r>
               <a:rPr lang="en-US" sz="2400" b="1" dirty="0"/>
-              <a:t>Open LLMs (Gemini)</a:t>
+              <a:t>LLMs (Capability) (</a:t>
+            </a:r>
+            <a:r>
+              <a:rPr lang="en-US" sz="1800" b="1" dirty="0">
+                <a:solidFill>
+                  <a:srgbClr val="00B050"/>
+                </a:solidFill>
+              </a:rPr>
+              <a:t>gemini-2.0-flash</a:t>
+            </a:r>
+            <a:r>
+              <a:rPr lang="en-US" sz="1800" b="1" dirty="0"/>
+              <a:t>, </a:t>
+            </a:r>
+            <a:r>
+              <a:rPr lang="en-US" sz="1800" b="1" dirty="0">
+                <a:solidFill>
+                  <a:srgbClr val="FF0000"/>
+                </a:solidFill>
+              </a:rPr>
+              <a:t>gemini-2.0-flash-lite</a:t>
+            </a:r>
+            <a:r>
+              <a:rPr lang="en-US" sz="1800" b="1" dirty="0"/>
+              <a:t>,</a:t>
+            </a:r>
+            <a:r>
+              <a:rPr lang="en-US" sz="1800" b="1" dirty="0">
+                <a:solidFill>
+                  <a:srgbClr val="FF0000"/>
+                </a:solidFill>
+              </a:rPr>
+              <a:t> gemini-1.5-flash</a:t>
+            </a:r>
+            <a:r>
+              <a:rPr lang="en-US" sz="2400" b="1" dirty="0"/>
+              <a:t>)</a:t>
             </a:r>
           </a:p>
           <a:p>

</xml_diff>

<commit_message>
Add notebooks and utils updates
</commit_message>
<xml_diff>
--- a/Report.pptx
+++ b/Report.pptx
@@ -20,6 +20,10 @@
     <p:sldId id="272" r:id="rId14"/>
     <p:sldId id="270" r:id="rId15"/>
     <p:sldId id="271" r:id="rId16"/>
+    <p:sldId id="273" r:id="rId17"/>
+    <p:sldId id="274" r:id="rId18"/>
+    <p:sldId id="275" r:id="rId19"/>
+    <p:sldId id="277" r:id="rId20"/>
   </p:sldIdLst>
   <p:sldSz cx="12192000" cy="6858000"/>
   <p:notesSz cx="6858000" cy="9144000"/>
@@ -273,7 +277,7 @@
           <a:p>
             <a:fld id="{0EB9CCF3-6B96-4B5A-B8AA-029BD9435F88}" type="datetimeFigureOut">
               <a:rPr lang="en-US" smtClean="0"/>
-              <a:t>17-Jul-25</a:t>
+              <a:t>24-Jul-25</a:t>
             </a:fld>
             <a:endParaRPr lang="en-US"/>
           </a:p>
@@ -471,7 +475,7 @@
           <a:p>
             <a:fld id="{0EB9CCF3-6B96-4B5A-B8AA-029BD9435F88}" type="datetimeFigureOut">
               <a:rPr lang="en-US" smtClean="0"/>
-              <a:t>17-Jul-25</a:t>
+              <a:t>24-Jul-25</a:t>
             </a:fld>
             <a:endParaRPr lang="en-US"/>
           </a:p>
@@ -679,7 +683,7 @@
           <a:p>
             <a:fld id="{0EB9CCF3-6B96-4B5A-B8AA-029BD9435F88}" type="datetimeFigureOut">
               <a:rPr lang="en-US" smtClean="0"/>
-              <a:t>17-Jul-25</a:t>
+              <a:t>24-Jul-25</a:t>
             </a:fld>
             <a:endParaRPr lang="en-US"/>
           </a:p>
@@ -877,7 +881,7 @@
           <a:p>
             <a:fld id="{0EB9CCF3-6B96-4B5A-B8AA-029BD9435F88}" type="datetimeFigureOut">
               <a:rPr lang="en-US" smtClean="0"/>
-              <a:t>17-Jul-25</a:t>
+              <a:t>24-Jul-25</a:t>
             </a:fld>
             <a:endParaRPr lang="en-US"/>
           </a:p>
@@ -1152,7 +1156,7 @@
           <a:p>
             <a:fld id="{0EB9CCF3-6B96-4B5A-B8AA-029BD9435F88}" type="datetimeFigureOut">
               <a:rPr lang="en-US" smtClean="0"/>
-              <a:t>17-Jul-25</a:t>
+              <a:t>24-Jul-25</a:t>
             </a:fld>
             <a:endParaRPr lang="en-US"/>
           </a:p>
@@ -1417,7 +1421,7 @@
           <a:p>
             <a:fld id="{0EB9CCF3-6B96-4B5A-B8AA-029BD9435F88}" type="datetimeFigureOut">
               <a:rPr lang="en-US" smtClean="0"/>
-              <a:t>17-Jul-25</a:t>
+              <a:t>24-Jul-25</a:t>
             </a:fld>
             <a:endParaRPr lang="en-US"/>
           </a:p>
@@ -1829,7 +1833,7 @@
           <a:p>
             <a:fld id="{0EB9CCF3-6B96-4B5A-B8AA-029BD9435F88}" type="datetimeFigureOut">
               <a:rPr lang="en-US" smtClean="0"/>
-              <a:t>17-Jul-25</a:t>
+              <a:t>24-Jul-25</a:t>
             </a:fld>
             <a:endParaRPr lang="en-US"/>
           </a:p>
@@ -1970,7 +1974,7 @@
           <a:p>
             <a:fld id="{0EB9CCF3-6B96-4B5A-B8AA-029BD9435F88}" type="datetimeFigureOut">
               <a:rPr lang="en-US" smtClean="0"/>
-              <a:t>17-Jul-25</a:t>
+              <a:t>24-Jul-25</a:t>
             </a:fld>
             <a:endParaRPr lang="en-US"/>
           </a:p>
@@ -2083,7 +2087,7 @@
           <a:p>
             <a:fld id="{0EB9CCF3-6B96-4B5A-B8AA-029BD9435F88}" type="datetimeFigureOut">
               <a:rPr lang="en-US" smtClean="0"/>
-              <a:t>17-Jul-25</a:t>
+              <a:t>24-Jul-25</a:t>
             </a:fld>
             <a:endParaRPr lang="en-US"/>
           </a:p>
@@ -2394,7 +2398,7 @@
           <a:p>
             <a:fld id="{0EB9CCF3-6B96-4B5A-B8AA-029BD9435F88}" type="datetimeFigureOut">
               <a:rPr lang="en-US" smtClean="0"/>
-              <a:t>17-Jul-25</a:t>
+              <a:t>24-Jul-25</a:t>
             </a:fld>
             <a:endParaRPr lang="en-US"/>
           </a:p>
@@ -2682,7 +2686,7 @@
           <a:p>
             <a:fld id="{0EB9CCF3-6B96-4B5A-B8AA-029BD9435F88}" type="datetimeFigureOut">
               <a:rPr lang="en-US" smtClean="0"/>
-              <a:t>17-Jul-25</a:t>
+              <a:t>24-Jul-25</a:t>
             </a:fld>
             <a:endParaRPr lang="en-US"/>
           </a:p>
@@ -2923,7 +2927,7 @@
           <a:p>
             <a:fld id="{0EB9CCF3-6B96-4B5A-B8AA-029BD9435F88}" type="datetimeFigureOut">
               <a:rPr lang="en-US" smtClean="0"/>
-              <a:t>17-Jul-25</a:t>
+              <a:t>24-Jul-25</a:t>
             </a:fld>
             <a:endParaRPr lang="en-US"/>
           </a:p>
@@ -7476,6 +7480,1574 @@
 </p:sld>
 </file>
 
+<file path=ppt/slides/slide16.xml><?xml version="1.0" encoding="utf-8"?>
+<p:sld xmlns:a="http://schemas.openxmlformats.org/drawingml/2006/main" xmlns:r="http://schemas.openxmlformats.org/officeDocument/2006/relationships" xmlns:p="http://schemas.openxmlformats.org/presentationml/2006/main">
+  <p:cSld>
+    <p:bg>
+      <p:bgPr>
+        <a:solidFill>
+          <a:schemeClr val="bg1"/>
+        </a:solidFill>
+        <a:effectLst/>
+      </p:bgPr>
+    </p:bg>
+    <p:spTree>
+      <p:nvGrpSpPr>
+        <p:cNvPr id="1" name="">
+          <a:extLst>
+            <a:ext uri="{FF2B5EF4-FFF2-40B4-BE49-F238E27FC236}">
+              <a16:creationId xmlns:a16="http://schemas.microsoft.com/office/drawing/2014/main" id="{B5B25D29-E44E-73D3-122C-ED943B97C3BD}"/>
+            </a:ext>
+          </a:extLst>
+        </p:cNvPr>
+        <p:cNvGrpSpPr/>
+        <p:nvPr/>
+      </p:nvGrpSpPr>
+      <p:grpSpPr>
+        <a:xfrm>
+          <a:off x="0" y="0"/>
+          <a:ext cx="0" cy="0"/>
+          <a:chOff x="0" y="0"/>
+          <a:chExt cx="0" cy="0"/>
+        </a:xfrm>
+      </p:grpSpPr>
+      <p:sp useBgFill="1">
+        <p:nvSpPr>
+          <p:cNvPr id="21" name="Rectangle 20">
+            <a:extLst>
+              <a:ext uri="{FF2B5EF4-FFF2-40B4-BE49-F238E27FC236}">
+                <a16:creationId xmlns:a16="http://schemas.microsoft.com/office/drawing/2014/main" id="{DAF1966E-FD40-4A4A-B61B-C4DF7FA05F06}"/>
+              </a:ext>
+              <a:ext uri="{C183D7F6-B498-43B3-948B-1728B52AA6E4}">
+                <adec:decorative xmlns:adec="http://schemas.microsoft.com/office/drawing/2017/decorative" val="1"/>
+              </a:ext>
+            </a:extLst>
+          </p:cNvPr>
+          <p:cNvSpPr>
+            <a:spLocks noGrp="1" noRot="1" noChangeAspect="1" noMove="1" noResize="1" noEditPoints="1" noAdjustHandles="1" noChangeArrowheads="1" noChangeShapeType="1" noTextEdit="1"/>
+          </p:cNvSpPr>
+          <p:nvPr>
+            <p:extLst>
+              <p:ext uri="{386F3935-93C4-4BCD-93E2-E3B085C9AB24}">
+                <p16:designElem xmlns:p16="http://schemas.microsoft.com/office/powerpoint/2015/main" val="1"/>
+              </p:ext>
+            </p:extLst>
+          </p:nvPr>
+        </p:nvSpPr>
+        <p:spPr>
+          <a:xfrm>
+            <a:off x="0" y="0"/>
+            <a:ext cx="12192000" cy="6858000"/>
+          </a:xfrm>
+          <a:prstGeom prst="rect">
+            <a:avLst/>
+          </a:prstGeom>
+          <a:ln>
+            <a:noFill/>
+          </a:ln>
+        </p:spPr>
+        <p:style>
+          <a:lnRef idx="2">
+            <a:schemeClr val="accent1">
+              <a:shade val="50000"/>
+            </a:schemeClr>
+          </a:lnRef>
+          <a:fillRef idx="1">
+            <a:schemeClr val="accent1"/>
+          </a:fillRef>
+          <a:effectRef idx="0">
+            <a:schemeClr val="accent1"/>
+          </a:effectRef>
+          <a:fontRef idx="minor">
+            <a:schemeClr val="lt1"/>
+          </a:fontRef>
+        </p:style>
+        <p:txBody>
+          <a:bodyPr rtlCol="0" anchor="ctr"/>
+          <a:lstStyle/>
+          <a:p>
+            <a:pPr algn="ctr"/>
+            <a:endParaRPr lang="en-US"/>
+          </a:p>
+        </p:txBody>
+      </p:sp>
+      <p:sp useBgFill="1">
+        <p:nvSpPr>
+          <p:cNvPr id="23" name="Rectangle 22">
+            <a:extLst>
+              <a:ext uri="{FF2B5EF4-FFF2-40B4-BE49-F238E27FC236}">
+                <a16:creationId xmlns:a16="http://schemas.microsoft.com/office/drawing/2014/main" id="{047BFA19-D45E-416B-A404-7AF2F3F27017}"/>
+              </a:ext>
+              <a:ext uri="{C183D7F6-B498-43B3-948B-1728B52AA6E4}">
+                <adec:decorative xmlns:adec="http://schemas.microsoft.com/office/drawing/2017/decorative" val="1"/>
+              </a:ext>
+            </a:extLst>
+          </p:cNvPr>
+          <p:cNvSpPr>
+            <a:spLocks noGrp="1" noRot="1" noChangeAspect="1" noMove="1" noResize="1" noEditPoints="1" noAdjustHandles="1" noChangeArrowheads="1" noChangeShapeType="1" noTextEdit="1"/>
+          </p:cNvSpPr>
+          <p:nvPr>
+            <p:extLst>
+              <p:ext uri="{386F3935-93C4-4BCD-93E2-E3B085C9AB24}">
+                <p16:designElem xmlns:p16="http://schemas.microsoft.com/office/powerpoint/2015/main" val="1"/>
+              </p:ext>
+            </p:extLst>
+          </p:nvPr>
+        </p:nvSpPr>
+        <p:spPr>
+          <a:xfrm>
+            <a:off x="558209" y="0"/>
+            <a:ext cx="11167447" cy="2018806"/>
+          </a:xfrm>
+          <a:prstGeom prst="rect">
+            <a:avLst/>
+          </a:prstGeom>
+          <a:ln w="9525">
+            <a:solidFill>
+              <a:srgbClr val="E1E1E1"/>
+            </a:solidFill>
+          </a:ln>
+          <a:effectLst>
+            <a:outerShdw blurRad="50800" dist="38100" dir="2700000" algn="tl" rotWithShape="0">
+              <a:schemeClr val="bg1">
+                <a:lumMod val="85000"/>
+                <a:alpha val="50000"/>
+              </a:schemeClr>
+            </a:outerShdw>
+          </a:effectLst>
+        </p:spPr>
+        <p:style>
+          <a:lnRef idx="2">
+            <a:schemeClr val="accent1">
+              <a:shade val="50000"/>
+            </a:schemeClr>
+          </a:lnRef>
+          <a:fillRef idx="1">
+            <a:schemeClr val="accent1"/>
+          </a:fillRef>
+          <a:effectRef idx="0">
+            <a:schemeClr val="accent1"/>
+          </a:effectRef>
+          <a:fontRef idx="minor">
+            <a:schemeClr val="lt1"/>
+          </a:fontRef>
+        </p:style>
+        <p:txBody>
+          <a:bodyPr rtlCol="0" anchor="ctr"/>
+          <a:lstStyle/>
+          <a:p>
+            <a:pPr marL="0" marR="0" lvl="0" indent="0" algn="ctr" defTabSz="914400" rtl="0" eaLnBrk="1" fontAlgn="auto" latinLnBrk="0" hangingPunct="1">
+              <a:lnSpc>
+                <a:spcPct val="100000"/>
+              </a:lnSpc>
+              <a:spcBef>
+                <a:spcPts val="0"/>
+              </a:spcBef>
+              <a:spcAft>
+                <a:spcPts val="0"/>
+              </a:spcAft>
+              <a:buClrTx/>
+              <a:buSzTx/>
+              <a:buFontTx/>
+              <a:buNone/>
+              <a:tabLst/>
+              <a:defRPr/>
+            </a:pPr>
+            <a:endParaRPr kumimoji="0" lang="en-US" sz="1800" b="0" i="0" u="none" strike="noStrike" kern="1200" cap="none" spc="0" normalizeH="0" baseline="0" noProof="0">
+              <a:ln>
+                <a:noFill/>
+              </a:ln>
+              <a:solidFill>
+                <a:prstClr val="white"/>
+              </a:solidFill>
+              <a:effectLst/>
+              <a:uLnTx/>
+              <a:uFillTx/>
+              <a:latin typeface="Calibri" panose="020F0502020204030204"/>
+              <a:ea typeface="+mn-ea"/>
+              <a:cs typeface="+mn-cs"/>
+            </a:endParaRPr>
+          </a:p>
+        </p:txBody>
+      </p:sp>
+      <p:sp useBgFill="1">
+        <p:nvSpPr>
+          <p:cNvPr id="25" name="Rectangle 24">
+            <a:extLst>
+              <a:ext uri="{FF2B5EF4-FFF2-40B4-BE49-F238E27FC236}">
+                <a16:creationId xmlns:a16="http://schemas.microsoft.com/office/drawing/2014/main" id="{8E0105E7-23DB-4CF2-8258-FF47C7620F6E}"/>
+              </a:ext>
+              <a:ext uri="{C183D7F6-B498-43B3-948B-1728B52AA6E4}">
+                <adec:decorative xmlns:adec="http://schemas.microsoft.com/office/drawing/2017/decorative" val="1"/>
+              </a:ext>
+            </a:extLst>
+          </p:cNvPr>
+          <p:cNvSpPr>
+            <a:spLocks noGrp="1" noRot="1" noChangeAspect="1" noMove="1" noResize="1" noEditPoints="1" noAdjustHandles="1" noChangeArrowheads="1" noChangeShapeType="1" noTextEdit="1"/>
+          </p:cNvSpPr>
+          <p:nvPr>
+            <p:extLst>
+              <p:ext uri="{386F3935-93C4-4BCD-93E2-E3B085C9AB24}">
+                <p16:designElem xmlns:p16="http://schemas.microsoft.com/office/powerpoint/2015/main" val="1"/>
+              </p:ext>
+            </p:extLst>
+          </p:nvPr>
+        </p:nvSpPr>
+        <p:spPr>
+          <a:xfrm>
+            <a:off x="566928" y="0"/>
+            <a:ext cx="11155680" cy="2011680"/>
+          </a:xfrm>
+          <a:prstGeom prst="rect">
+            <a:avLst/>
+          </a:prstGeom>
+          <a:ln w="9525">
+            <a:noFill/>
+          </a:ln>
+          <a:effectLst/>
+        </p:spPr>
+        <p:style>
+          <a:lnRef idx="2">
+            <a:schemeClr val="accent1">
+              <a:shade val="50000"/>
+            </a:schemeClr>
+          </a:lnRef>
+          <a:fillRef idx="1">
+            <a:schemeClr val="accent1"/>
+          </a:fillRef>
+          <a:effectRef idx="0">
+            <a:schemeClr val="accent1"/>
+          </a:effectRef>
+          <a:fontRef idx="minor">
+            <a:schemeClr val="lt1"/>
+          </a:fontRef>
+        </p:style>
+        <p:txBody>
+          <a:bodyPr rtlCol="0" anchor="ctr"/>
+          <a:lstStyle/>
+          <a:p>
+            <a:pPr marL="0" marR="0" lvl="0" indent="0" algn="ctr" defTabSz="914400" rtl="0" eaLnBrk="1" fontAlgn="auto" latinLnBrk="0" hangingPunct="1">
+              <a:lnSpc>
+                <a:spcPct val="100000"/>
+              </a:lnSpc>
+              <a:spcBef>
+                <a:spcPts val="0"/>
+              </a:spcBef>
+              <a:spcAft>
+                <a:spcPts val="0"/>
+              </a:spcAft>
+              <a:buClrTx/>
+              <a:buSzTx/>
+              <a:buFontTx/>
+              <a:buNone/>
+              <a:tabLst/>
+              <a:defRPr/>
+            </a:pPr>
+            <a:endParaRPr kumimoji="0" lang="en-US" sz="1800" b="0" i="0" u="none" strike="noStrike" kern="1200" cap="none" spc="0" normalizeH="0" baseline="0" noProof="0">
+              <a:ln>
+                <a:noFill/>
+              </a:ln>
+              <a:solidFill>
+                <a:prstClr val="white"/>
+              </a:solidFill>
+              <a:effectLst/>
+              <a:uLnTx/>
+              <a:uFillTx/>
+              <a:latin typeface="Calibri" panose="020F0502020204030204"/>
+              <a:ea typeface="+mn-ea"/>
+              <a:cs typeface="+mn-cs"/>
+            </a:endParaRPr>
+          </a:p>
+        </p:txBody>
+      </p:sp>
+      <p:sp>
+        <p:nvSpPr>
+          <p:cNvPr id="2" name="Title 1">
+            <a:extLst>
+              <a:ext uri="{FF2B5EF4-FFF2-40B4-BE49-F238E27FC236}">
+                <a16:creationId xmlns:a16="http://schemas.microsoft.com/office/drawing/2014/main" id="{59CB1B09-99F5-B54F-F049-2EC2BC3E0F30}"/>
+              </a:ext>
+            </a:extLst>
+          </p:cNvPr>
+          <p:cNvSpPr>
+            <a:spLocks noGrp="1"/>
+          </p:cNvSpPr>
+          <p:nvPr>
+            <p:ph type="title"/>
+          </p:nvPr>
+        </p:nvSpPr>
+        <p:spPr>
+          <a:xfrm>
+            <a:off x="1115568" y="416052"/>
+            <a:ext cx="10168128" cy="1179576"/>
+          </a:xfrm>
+        </p:spPr>
+        <p:txBody>
+          <a:bodyPr>
+            <a:normAutofit/>
+          </a:bodyPr>
+          <a:lstStyle/>
+          <a:p>
+            <a:pPr algn="ctr"/>
+            <a:r>
+              <a:rPr lang="en-US" sz="2800" b="1" dirty="0"/>
+              <a:t>Evaluator</a:t>
+            </a:r>
+            <a:br>
+              <a:rPr lang="en-US" sz="3700" dirty="0"/>
+            </a:br>
+            <a:r>
+              <a:rPr lang="en-US" sz="3700" dirty="0" err="1">
+                <a:solidFill>
+                  <a:srgbClr val="FF0000"/>
+                </a:solidFill>
+              </a:rPr>
+              <a:t>WebArena</a:t>
+            </a:r>
+            <a:endParaRPr lang="en-US" sz="3700" dirty="0">
+              <a:solidFill>
+                <a:srgbClr val="FF0000"/>
+              </a:solidFill>
+            </a:endParaRPr>
+          </a:p>
+        </p:txBody>
+      </p:sp>
+      <p:sp>
+        <p:nvSpPr>
+          <p:cNvPr id="27" name="Rectangle 26">
+            <a:extLst>
+              <a:ext uri="{FF2B5EF4-FFF2-40B4-BE49-F238E27FC236}">
+                <a16:creationId xmlns:a16="http://schemas.microsoft.com/office/drawing/2014/main" id="{074B4F7D-14B2-478B-8BF5-01E4E0C5D263}"/>
+              </a:ext>
+              <a:ext uri="{C183D7F6-B498-43B3-948B-1728B52AA6E4}">
+                <adec:decorative xmlns:adec="http://schemas.microsoft.com/office/drawing/2017/decorative" val="1"/>
+              </a:ext>
+            </a:extLst>
+          </p:cNvPr>
+          <p:cNvSpPr>
+            <a:spLocks noGrp="1" noRot="1" noChangeAspect="1" noMove="1" noResize="1" noEditPoints="1" noAdjustHandles="1" noChangeArrowheads="1" noChangeShapeType="1" noTextEdit="1"/>
+          </p:cNvSpPr>
+          <p:nvPr>
+            <p:extLst>
+              <p:ext uri="{386F3935-93C4-4BCD-93E2-E3B085C9AB24}">
+                <p16:designElem xmlns:p16="http://schemas.microsoft.com/office/powerpoint/2015/main" val="1"/>
+              </p:ext>
+            </p:extLst>
+          </p:nvPr>
+        </p:nvSpPr>
+        <p:spPr>
+          <a:xfrm>
+            <a:off x="498834" y="758952"/>
+            <a:ext cx="128016" cy="704088"/>
+          </a:xfrm>
+          <a:prstGeom prst="rect">
+            <a:avLst/>
+          </a:prstGeom>
+          <a:solidFill>
+            <a:schemeClr val="accent2"/>
+          </a:solidFill>
+          <a:ln>
+            <a:noFill/>
+          </a:ln>
+        </p:spPr>
+        <p:style>
+          <a:lnRef idx="2">
+            <a:schemeClr val="accent1">
+              <a:shade val="50000"/>
+            </a:schemeClr>
+          </a:lnRef>
+          <a:fillRef idx="1">
+            <a:schemeClr val="accent1"/>
+          </a:fillRef>
+          <a:effectRef idx="0">
+            <a:schemeClr val="accent1"/>
+          </a:effectRef>
+          <a:fontRef idx="minor">
+            <a:schemeClr val="lt1"/>
+          </a:fontRef>
+        </p:style>
+        <p:txBody>
+          <a:bodyPr rtlCol="0" anchor="ctr"/>
+          <a:lstStyle/>
+          <a:p>
+            <a:pPr algn="ctr"/>
+            <a:endParaRPr lang="en-US">
+              <a:solidFill>
+                <a:prstClr val="white"/>
+              </a:solidFill>
+              <a:latin typeface="Calibri" panose="020F0502020204030204"/>
+            </a:endParaRPr>
+          </a:p>
+        </p:txBody>
+      </p:sp>
+      <p:sp>
+        <p:nvSpPr>
+          <p:cNvPr id="3" name="Content Placeholder 2">
+            <a:extLst>
+              <a:ext uri="{FF2B5EF4-FFF2-40B4-BE49-F238E27FC236}">
+                <a16:creationId xmlns:a16="http://schemas.microsoft.com/office/drawing/2014/main" id="{4B633272-F744-703E-A0D4-FE9D3065C535}"/>
+              </a:ext>
+            </a:extLst>
+          </p:cNvPr>
+          <p:cNvSpPr>
+            <a:spLocks noGrp="1"/>
+          </p:cNvSpPr>
+          <p:nvPr>
+            <p:ph idx="1"/>
+          </p:nvPr>
+        </p:nvSpPr>
+        <p:spPr>
+          <a:xfrm>
+            <a:off x="1115568" y="2101620"/>
+            <a:ext cx="10486497" cy="4417167"/>
+          </a:xfrm>
+        </p:spPr>
+        <p:txBody>
+          <a:bodyPr>
+            <a:normAutofit/>
+          </a:bodyPr>
+          <a:lstStyle/>
+          <a:p>
+            <a:pPr>
+              <a:lnSpc>
+                <a:spcPct val="160000"/>
+              </a:lnSpc>
+            </a:pPr>
+            <a:r>
+              <a:rPr lang="en-US" sz="2200" b="1" dirty="0"/>
+              <a:t>Task Success Rate  /  Exact match (10/17) ? / prefix match ? </a:t>
+            </a:r>
+          </a:p>
+          <a:p>
+            <a:pPr>
+              <a:lnSpc>
+                <a:spcPct val="160000"/>
+              </a:lnSpc>
+            </a:pPr>
+            <a:r>
+              <a:rPr lang="en-US" sz="2200" b="1" dirty="0"/>
+              <a:t>Human Performance (~2 people) / </a:t>
+            </a:r>
+            <a:r>
+              <a:rPr lang="en-US" sz="2200" b="1" dirty="0" err="1"/>
+              <a:t>Webarena</a:t>
+            </a:r>
+            <a:r>
+              <a:rPr lang="en-US" sz="2200" b="1" dirty="0"/>
+              <a:t> reference</a:t>
+            </a:r>
+          </a:p>
+          <a:p>
+            <a:pPr>
+              <a:lnSpc>
+                <a:spcPct val="160000"/>
+              </a:lnSpc>
+            </a:pPr>
+            <a:r>
+              <a:rPr lang="en-US" sz="2200" b="1" dirty="0"/>
+              <a:t>Chain of thought </a:t>
+            </a:r>
+            <a:r>
+              <a:rPr lang="en-US" sz="2200" dirty="0"/>
+              <a:t>(</a:t>
+            </a:r>
+            <a:r>
+              <a:rPr lang="en-US" sz="2200" dirty="0" err="1"/>
+              <a:t>CoT</a:t>
+            </a:r>
+            <a:r>
+              <a:rPr lang="en-US" sz="2200" dirty="0"/>
+              <a:t>) and No </a:t>
+            </a:r>
+            <a:r>
+              <a:rPr lang="en-US" sz="2200" dirty="0" err="1"/>
+              <a:t>CoT</a:t>
+            </a:r>
+            <a:r>
+              <a:rPr lang="en-US" sz="2200" dirty="0"/>
+              <a:t> in Prompting</a:t>
+            </a:r>
+          </a:p>
+          <a:p>
+            <a:pPr>
+              <a:lnSpc>
+                <a:spcPct val="160000"/>
+              </a:lnSpc>
+            </a:pPr>
+            <a:r>
+              <a:rPr lang="en-US" sz="2200" b="1" dirty="0"/>
+              <a:t>Early Stop Error Rate </a:t>
+            </a:r>
+            <a:r>
+              <a:rPr lang="en-US" sz="2200" dirty="0"/>
+              <a:t>: Unachievable hint (Yes / no) in Prompting</a:t>
+            </a:r>
+          </a:p>
+          <a:p>
+            <a:pPr>
+              <a:lnSpc>
+                <a:spcPct val="160000"/>
+              </a:lnSpc>
+            </a:pPr>
+            <a:r>
+              <a:rPr lang="en-US" sz="2200" b="1" dirty="0"/>
+              <a:t>Action Accuracy </a:t>
+            </a:r>
+            <a:r>
+              <a:rPr lang="en-US" sz="2200" dirty="0"/>
+              <a:t>(?)</a:t>
+            </a:r>
+          </a:p>
+          <a:p>
+            <a:pPr>
+              <a:lnSpc>
+                <a:spcPct val="160000"/>
+              </a:lnSpc>
+            </a:pPr>
+            <a:r>
+              <a:rPr lang="en-US" sz="2200" dirty="0" err="1"/>
+              <a:t>Seeclick</a:t>
+            </a:r>
+            <a:r>
+              <a:rPr lang="en-US" sz="2200" dirty="0"/>
+              <a:t> + </a:t>
+            </a:r>
+            <a:r>
+              <a:rPr lang="en-US" sz="2200" dirty="0" err="1"/>
+              <a:t>Hxagent</a:t>
+            </a:r>
+            <a:r>
+              <a:rPr lang="en-US" sz="2200" dirty="0"/>
+              <a:t> </a:t>
+            </a:r>
+          </a:p>
+        </p:txBody>
+      </p:sp>
+    </p:spTree>
+    <p:extLst>
+      <p:ext uri="{BB962C8B-B14F-4D97-AF65-F5344CB8AC3E}">
+        <p14:creationId xmlns:p14="http://schemas.microsoft.com/office/powerpoint/2010/main" val="3465346757"/>
+      </p:ext>
+    </p:extLst>
+  </p:cSld>
+  <p:clrMapOvr>
+    <a:masterClrMapping/>
+  </p:clrMapOvr>
+</p:sld>
+</file>
+
+<file path=ppt/slides/slide17.xml><?xml version="1.0" encoding="utf-8"?>
+<p:sld xmlns:a="http://schemas.openxmlformats.org/drawingml/2006/main" xmlns:r="http://schemas.openxmlformats.org/officeDocument/2006/relationships" xmlns:p="http://schemas.openxmlformats.org/presentationml/2006/main">
+  <p:cSld>
+    <p:bg>
+      <p:bgPr>
+        <a:solidFill>
+          <a:schemeClr val="bg1"/>
+        </a:solidFill>
+        <a:effectLst/>
+      </p:bgPr>
+    </p:bg>
+    <p:spTree>
+      <p:nvGrpSpPr>
+        <p:cNvPr id="1" name="">
+          <a:extLst>
+            <a:ext uri="{FF2B5EF4-FFF2-40B4-BE49-F238E27FC236}">
+              <a16:creationId xmlns:a16="http://schemas.microsoft.com/office/drawing/2014/main" id="{A31E3B2B-C3B6-7CB1-21FD-58FF52232D90}"/>
+            </a:ext>
+          </a:extLst>
+        </p:cNvPr>
+        <p:cNvGrpSpPr/>
+        <p:nvPr/>
+      </p:nvGrpSpPr>
+      <p:grpSpPr>
+        <a:xfrm>
+          <a:off x="0" y="0"/>
+          <a:ext cx="0" cy="0"/>
+          <a:chOff x="0" y="0"/>
+          <a:chExt cx="0" cy="0"/>
+        </a:xfrm>
+      </p:grpSpPr>
+      <p:sp useBgFill="1">
+        <p:nvSpPr>
+          <p:cNvPr id="21" name="Rectangle 20">
+            <a:extLst>
+              <a:ext uri="{FF2B5EF4-FFF2-40B4-BE49-F238E27FC236}">
+                <a16:creationId xmlns:a16="http://schemas.microsoft.com/office/drawing/2014/main" id="{5DCB5928-DC7D-4612-9922-441966E15627}"/>
+              </a:ext>
+              <a:ext uri="{C183D7F6-B498-43B3-948B-1728B52AA6E4}">
+                <adec:decorative xmlns:adec="http://schemas.microsoft.com/office/drawing/2017/decorative" val="1"/>
+              </a:ext>
+            </a:extLst>
+          </p:cNvPr>
+          <p:cNvSpPr>
+            <a:spLocks noGrp="1" noRot="1" noChangeAspect="1" noMove="1" noResize="1" noEditPoints="1" noAdjustHandles="1" noChangeArrowheads="1" noChangeShapeType="1" noTextEdit="1"/>
+          </p:cNvSpPr>
+          <p:nvPr>
+            <p:extLst>
+              <p:ext uri="{386F3935-93C4-4BCD-93E2-E3B085C9AB24}">
+                <p16:designElem xmlns:p16="http://schemas.microsoft.com/office/powerpoint/2015/main" val="1"/>
+              </p:ext>
+            </p:extLst>
+          </p:nvPr>
+        </p:nvSpPr>
+        <p:spPr>
+          <a:xfrm>
+            <a:off x="0" y="0"/>
+            <a:ext cx="12192000" cy="6858000"/>
+          </a:xfrm>
+          <a:prstGeom prst="rect">
+            <a:avLst/>
+          </a:prstGeom>
+          <a:ln>
+            <a:noFill/>
+          </a:ln>
+        </p:spPr>
+        <p:style>
+          <a:lnRef idx="2">
+            <a:schemeClr val="accent1">
+              <a:shade val="50000"/>
+            </a:schemeClr>
+          </a:lnRef>
+          <a:fillRef idx="1">
+            <a:schemeClr val="accent1"/>
+          </a:fillRef>
+          <a:effectRef idx="0">
+            <a:schemeClr val="accent1"/>
+          </a:effectRef>
+          <a:fontRef idx="minor">
+            <a:schemeClr val="lt1"/>
+          </a:fontRef>
+        </p:style>
+        <p:txBody>
+          <a:bodyPr rtlCol="0" anchor="ctr"/>
+          <a:lstStyle/>
+          <a:p>
+            <a:pPr algn="ctr"/>
+            <a:endParaRPr lang="en-US"/>
+          </a:p>
+        </p:txBody>
+      </p:sp>
+      <p:sp useBgFill="1">
+        <p:nvSpPr>
+          <p:cNvPr id="23" name="Freeform: Shape 22">
+            <a:extLst>
+              <a:ext uri="{FF2B5EF4-FFF2-40B4-BE49-F238E27FC236}">
+                <a16:creationId xmlns:a16="http://schemas.microsoft.com/office/drawing/2014/main" id="{682C1161-1736-45EC-99B7-33F3CAE9D517}"/>
+              </a:ext>
+              <a:ext uri="{C183D7F6-B498-43B3-948B-1728B52AA6E4}">
+                <adec:decorative xmlns:adec="http://schemas.microsoft.com/office/drawing/2017/decorative" val="1"/>
+              </a:ext>
+            </a:extLst>
+          </p:cNvPr>
+          <p:cNvSpPr>
+            <a:spLocks noGrp="1" noRot="1" noChangeAspect="1" noMove="1" noResize="1" noEditPoints="1" noAdjustHandles="1" noChangeArrowheads="1" noChangeShapeType="1" noTextEdit="1"/>
+          </p:cNvSpPr>
+          <p:nvPr>
+            <p:extLst>
+              <p:ext uri="{386F3935-93C4-4BCD-93E2-E3B085C9AB24}">
+                <p16:designElem xmlns:p16="http://schemas.microsoft.com/office/powerpoint/2015/main" val="1"/>
+              </p:ext>
+            </p:extLst>
+          </p:nvPr>
+        </p:nvSpPr>
+        <p:spPr>
+          <a:xfrm>
+            <a:off x="0" y="0"/>
+            <a:ext cx="4959047" cy="6858000"/>
+          </a:xfrm>
+          <a:custGeom>
+            <a:avLst/>
+            <a:gdLst>
+              <a:gd name="connsiteX0" fmla="*/ 0 w 4959047"/>
+              <a:gd name="connsiteY0" fmla="*/ 0 h 6858000"/>
+              <a:gd name="connsiteX1" fmla="*/ 4110127 w 4959047"/>
+              <a:gd name="connsiteY1" fmla="*/ 0 h 6858000"/>
+              <a:gd name="connsiteX2" fmla="*/ 4179024 w 4959047"/>
+              <a:gd name="connsiteY2" fmla="*/ 123368 h 6858000"/>
+              <a:gd name="connsiteX3" fmla="*/ 4959047 w 4959047"/>
+              <a:gd name="connsiteY3" fmla="*/ 3429000 h 6858000"/>
+              <a:gd name="connsiteX4" fmla="*/ 4179024 w 4959047"/>
+              <a:gd name="connsiteY4" fmla="*/ 6734633 h 6858000"/>
+              <a:gd name="connsiteX5" fmla="*/ 4110127 w 4959047"/>
+              <a:gd name="connsiteY5" fmla="*/ 6858000 h 6858000"/>
+              <a:gd name="connsiteX6" fmla="*/ 0 w 4959047"/>
+              <a:gd name="connsiteY6" fmla="*/ 6858000 h 6858000"/>
+            </a:gdLst>
+            <a:ahLst/>
+            <a:cxnLst>
+              <a:cxn ang="0">
+                <a:pos x="connsiteX0" y="connsiteY0"/>
+              </a:cxn>
+              <a:cxn ang="0">
+                <a:pos x="connsiteX1" y="connsiteY1"/>
+              </a:cxn>
+              <a:cxn ang="0">
+                <a:pos x="connsiteX2" y="connsiteY2"/>
+              </a:cxn>
+              <a:cxn ang="0">
+                <a:pos x="connsiteX3" y="connsiteY3"/>
+              </a:cxn>
+              <a:cxn ang="0">
+                <a:pos x="connsiteX4" y="connsiteY4"/>
+              </a:cxn>
+              <a:cxn ang="0">
+                <a:pos x="connsiteX5" y="connsiteY5"/>
+              </a:cxn>
+              <a:cxn ang="0">
+                <a:pos x="connsiteX6" y="connsiteY6"/>
+              </a:cxn>
+            </a:cxnLst>
+            <a:rect l="l" t="t" r="r" b="b"/>
+            <a:pathLst>
+              <a:path w="4959047" h="6858000">
+                <a:moveTo>
+                  <a:pt x="0" y="0"/>
+                </a:moveTo>
+                <a:lnTo>
+                  <a:pt x="4110127" y="0"/>
+                </a:lnTo>
+                <a:lnTo>
+                  <a:pt x="4179024" y="123368"/>
+                </a:lnTo>
+                <a:cubicBezTo>
+                  <a:pt x="4668929" y="1045156"/>
+                  <a:pt x="4959047" y="2189404"/>
+                  <a:pt x="4959047" y="3429000"/>
+                </a:cubicBezTo>
+                <a:cubicBezTo>
+                  <a:pt x="4959047" y="4668597"/>
+                  <a:pt x="4668929" y="5812845"/>
+                  <a:pt x="4179024" y="6734633"/>
+                </a:cubicBezTo>
+                <a:lnTo>
+                  <a:pt x="4110127" y="6858000"/>
+                </a:lnTo>
+                <a:lnTo>
+                  <a:pt x="0" y="6858000"/>
+                </a:lnTo>
+                <a:close/>
+              </a:path>
+            </a:pathLst>
+          </a:custGeom>
+          <a:ln w="9525">
+            <a:solidFill>
+              <a:srgbClr val="E6E6E6"/>
+            </a:solidFill>
+          </a:ln>
+          <a:effectLst>
+            <a:outerShdw blurRad="76200" dist="38100" algn="l" rotWithShape="0">
+              <a:schemeClr val="bg1">
+                <a:lumMod val="85000"/>
+                <a:alpha val="50000"/>
+              </a:schemeClr>
+            </a:outerShdw>
+          </a:effectLst>
+        </p:spPr>
+        <p:style>
+          <a:lnRef idx="2">
+            <a:schemeClr val="accent1">
+              <a:shade val="50000"/>
+            </a:schemeClr>
+          </a:lnRef>
+          <a:fillRef idx="1">
+            <a:schemeClr val="accent1"/>
+          </a:fillRef>
+          <a:effectRef idx="0">
+            <a:schemeClr val="accent1"/>
+          </a:effectRef>
+          <a:fontRef idx="minor">
+            <a:schemeClr val="lt1"/>
+          </a:fontRef>
+        </p:style>
+        <p:txBody>
+          <a:bodyPr wrap="square" rtlCol="0" anchor="ctr">
+            <a:noAutofit/>
+          </a:bodyPr>
+          <a:lstStyle/>
+          <a:p>
+            <a:pPr marL="0" marR="0" lvl="0" indent="0" algn="ctr" defTabSz="914400" rtl="0" eaLnBrk="1" fontAlgn="auto" latinLnBrk="0" hangingPunct="1">
+              <a:lnSpc>
+                <a:spcPct val="100000"/>
+              </a:lnSpc>
+              <a:spcBef>
+                <a:spcPts val="0"/>
+              </a:spcBef>
+              <a:spcAft>
+                <a:spcPts val="0"/>
+              </a:spcAft>
+              <a:buClrTx/>
+              <a:buSzTx/>
+              <a:buFontTx/>
+              <a:buNone/>
+              <a:tabLst/>
+              <a:defRPr/>
+            </a:pPr>
+            <a:endParaRPr kumimoji="0" lang="en-US" sz="1800" b="0" i="0" u="none" strike="noStrike" kern="1200" cap="none" spc="0" normalizeH="0" baseline="0" noProof="0">
+              <a:ln>
+                <a:noFill/>
+              </a:ln>
+              <a:solidFill>
+                <a:prstClr val="white"/>
+              </a:solidFill>
+              <a:effectLst/>
+              <a:uLnTx/>
+              <a:uFillTx/>
+              <a:latin typeface="Calibri" panose="020F0502020204030204"/>
+              <a:ea typeface="+mn-ea"/>
+              <a:cs typeface="+mn-cs"/>
+            </a:endParaRPr>
+          </a:p>
+        </p:txBody>
+      </p:sp>
+      <p:sp useBgFill="1">
+        <p:nvSpPr>
+          <p:cNvPr id="25" name="Freeform: Shape 24">
+            <a:extLst>
+              <a:ext uri="{FF2B5EF4-FFF2-40B4-BE49-F238E27FC236}">
+                <a16:creationId xmlns:a16="http://schemas.microsoft.com/office/drawing/2014/main" id="{84D4DDB8-B68F-45B0-9F62-C4279996F672}"/>
+              </a:ext>
+              <a:ext uri="{C183D7F6-B498-43B3-948B-1728B52AA6E4}">
+                <adec:decorative xmlns:adec="http://schemas.microsoft.com/office/drawing/2017/decorative" val="1"/>
+              </a:ext>
+            </a:extLst>
+          </p:cNvPr>
+          <p:cNvSpPr>
+            <a:spLocks noGrp="1" noRot="1" noChangeAspect="1" noMove="1" noResize="1" noEditPoints="1" noAdjustHandles="1" noChangeArrowheads="1" noChangeShapeType="1" noTextEdit="1"/>
+          </p:cNvSpPr>
+          <p:nvPr>
+            <p:extLst>
+              <p:ext uri="{386F3935-93C4-4BCD-93E2-E3B085C9AB24}">
+                <p16:designElem xmlns:p16="http://schemas.microsoft.com/office/powerpoint/2015/main" val="1"/>
+              </p:ext>
+            </p:extLst>
+          </p:nvPr>
+        </p:nvSpPr>
+        <p:spPr>
+          <a:xfrm>
+            <a:off x="0" y="0"/>
+            <a:ext cx="4948887" cy="6858000"/>
+          </a:xfrm>
+          <a:custGeom>
+            <a:avLst/>
+            <a:gdLst>
+              <a:gd name="connsiteX0" fmla="*/ 0 w 4948887"/>
+              <a:gd name="connsiteY0" fmla="*/ 0 h 6858000"/>
+              <a:gd name="connsiteX1" fmla="*/ 4099967 w 4948887"/>
+              <a:gd name="connsiteY1" fmla="*/ 0 h 6858000"/>
+              <a:gd name="connsiteX2" fmla="*/ 4168864 w 4948887"/>
+              <a:gd name="connsiteY2" fmla="*/ 123368 h 6858000"/>
+              <a:gd name="connsiteX3" fmla="*/ 4948887 w 4948887"/>
+              <a:gd name="connsiteY3" fmla="*/ 3429000 h 6858000"/>
+              <a:gd name="connsiteX4" fmla="*/ 4168864 w 4948887"/>
+              <a:gd name="connsiteY4" fmla="*/ 6734633 h 6858000"/>
+              <a:gd name="connsiteX5" fmla="*/ 4099967 w 4948887"/>
+              <a:gd name="connsiteY5" fmla="*/ 6858000 h 6858000"/>
+              <a:gd name="connsiteX6" fmla="*/ 0 w 4948887"/>
+              <a:gd name="connsiteY6" fmla="*/ 6858000 h 6858000"/>
+            </a:gdLst>
+            <a:ahLst/>
+            <a:cxnLst>
+              <a:cxn ang="0">
+                <a:pos x="connsiteX0" y="connsiteY0"/>
+              </a:cxn>
+              <a:cxn ang="0">
+                <a:pos x="connsiteX1" y="connsiteY1"/>
+              </a:cxn>
+              <a:cxn ang="0">
+                <a:pos x="connsiteX2" y="connsiteY2"/>
+              </a:cxn>
+              <a:cxn ang="0">
+                <a:pos x="connsiteX3" y="connsiteY3"/>
+              </a:cxn>
+              <a:cxn ang="0">
+                <a:pos x="connsiteX4" y="connsiteY4"/>
+              </a:cxn>
+              <a:cxn ang="0">
+                <a:pos x="connsiteX5" y="connsiteY5"/>
+              </a:cxn>
+              <a:cxn ang="0">
+                <a:pos x="connsiteX6" y="connsiteY6"/>
+              </a:cxn>
+            </a:cxnLst>
+            <a:rect l="l" t="t" r="r" b="b"/>
+            <a:pathLst>
+              <a:path w="4948887" h="6858000">
+                <a:moveTo>
+                  <a:pt x="0" y="0"/>
+                </a:moveTo>
+                <a:lnTo>
+                  <a:pt x="4099967" y="0"/>
+                </a:lnTo>
+                <a:lnTo>
+                  <a:pt x="4168864" y="123368"/>
+                </a:lnTo>
+                <a:cubicBezTo>
+                  <a:pt x="4658769" y="1045156"/>
+                  <a:pt x="4948887" y="2189404"/>
+                  <a:pt x="4948887" y="3429000"/>
+                </a:cubicBezTo>
+                <a:cubicBezTo>
+                  <a:pt x="4948887" y="4668597"/>
+                  <a:pt x="4658769" y="5812845"/>
+                  <a:pt x="4168864" y="6734633"/>
+                </a:cubicBezTo>
+                <a:lnTo>
+                  <a:pt x="4099967" y="6858000"/>
+                </a:lnTo>
+                <a:lnTo>
+                  <a:pt x="0" y="6858000"/>
+                </a:lnTo>
+                <a:close/>
+              </a:path>
+            </a:pathLst>
+          </a:custGeom>
+          <a:ln w="9525">
+            <a:noFill/>
+          </a:ln>
+          <a:effectLst/>
+        </p:spPr>
+        <p:style>
+          <a:lnRef idx="2">
+            <a:schemeClr val="accent1">
+              <a:shade val="50000"/>
+            </a:schemeClr>
+          </a:lnRef>
+          <a:fillRef idx="1">
+            <a:schemeClr val="accent1"/>
+          </a:fillRef>
+          <a:effectRef idx="0">
+            <a:schemeClr val="accent1"/>
+          </a:effectRef>
+          <a:fontRef idx="minor">
+            <a:schemeClr val="lt1"/>
+          </a:fontRef>
+        </p:style>
+        <p:txBody>
+          <a:bodyPr wrap="square" rtlCol="0" anchor="ctr">
+            <a:noAutofit/>
+          </a:bodyPr>
+          <a:lstStyle/>
+          <a:p>
+            <a:pPr marL="0" marR="0" lvl="0" indent="0" algn="ctr" defTabSz="914400" rtl="0" eaLnBrk="1" fontAlgn="auto" latinLnBrk="0" hangingPunct="1">
+              <a:lnSpc>
+                <a:spcPct val="100000"/>
+              </a:lnSpc>
+              <a:spcBef>
+                <a:spcPts val="0"/>
+              </a:spcBef>
+              <a:spcAft>
+                <a:spcPts val="0"/>
+              </a:spcAft>
+              <a:buClrTx/>
+              <a:buSzTx/>
+              <a:buFontTx/>
+              <a:buNone/>
+              <a:tabLst/>
+              <a:defRPr/>
+            </a:pPr>
+            <a:endParaRPr kumimoji="0" lang="en-US" sz="1800" b="0" i="0" u="none" strike="noStrike" kern="1200" cap="none" spc="0" normalizeH="0" baseline="0" noProof="0">
+              <a:ln>
+                <a:noFill/>
+              </a:ln>
+              <a:solidFill>
+                <a:prstClr val="white"/>
+              </a:solidFill>
+              <a:effectLst/>
+              <a:uLnTx/>
+              <a:uFillTx/>
+              <a:latin typeface="Calibri" panose="020F0502020204030204"/>
+              <a:ea typeface="+mn-ea"/>
+              <a:cs typeface="+mn-cs"/>
+            </a:endParaRPr>
+          </a:p>
+        </p:txBody>
+      </p:sp>
+      <p:sp>
+        <p:nvSpPr>
+          <p:cNvPr id="2" name="Title 1">
+            <a:extLst>
+              <a:ext uri="{FF2B5EF4-FFF2-40B4-BE49-F238E27FC236}">
+                <a16:creationId xmlns:a16="http://schemas.microsoft.com/office/drawing/2014/main" id="{5C2D611F-E6EE-F48B-30A5-634CEE7EF748}"/>
+              </a:ext>
+            </a:extLst>
+          </p:cNvPr>
+          <p:cNvSpPr>
+            <a:spLocks noGrp="1"/>
+          </p:cNvSpPr>
+          <p:nvPr>
+            <p:ph type="title"/>
+          </p:nvPr>
+        </p:nvSpPr>
+        <p:spPr>
+          <a:xfrm>
+            <a:off x="477981" y="1122363"/>
+            <a:ext cx="4023360" cy="2760787"/>
+          </a:xfrm>
+        </p:spPr>
+        <p:txBody>
+          <a:bodyPr vert="horz" lIns="91440" tIns="45720" rIns="91440" bIns="45720" rtlCol="0" anchor="b">
+            <a:normAutofit/>
+          </a:bodyPr>
+          <a:lstStyle/>
+          <a:p>
+            <a:r>
+              <a:rPr lang="en-US" sz="3600" kern="1200" dirty="0">
+                <a:solidFill>
+                  <a:schemeClr val="tx1"/>
+                </a:solidFill>
+                <a:latin typeface="+mj-lt"/>
+                <a:ea typeface="+mj-ea"/>
+                <a:cs typeface="+mj-cs"/>
+              </a:rPr>
+              <a:t>Evaluator</a:t>
+            </a:r>
+            <a:br>
+              <a:rPr lang="en-US" sz="4800" kern="1200" dirty="0">
+                <a:solidFill>
+                  <a:schemeClr val="tx1"/>
+                </a:solidFill>
+                <a:latin typeface="+mj-lt"/>
+                <a:ea typeface="+mj-ea"/>
+                <a:cs typeface="+mj-cs"/>
+              </a:rPr>
+            </a:br>
+            <a:r>
+              <a:rPr lang="en-US" sz="4800" kern="1200" dirty="0" err="1">
+                <a:solidFill>
+                  <a:srgbClr val="FF0000"/>
+                </a:solidFill>
+                <a:latin typeface="+mj-lt"/>
+                <a:ea typeface="+mj-ea"/>
+                <a:cs typeface="+mj-cs"/>
+              </a:rPr>
+              <a:t>WebArena</a:t>
+            </a:r>
+            <a:endParaRPr lang="en-US" sz="4800" kern="1200" dirty="0">
+              <a:solidFill>
+                <a:srgbClr val="FF0000"/>
+              </a:solidFill>
+              <a:latin typeface="+mj-lt"/>
+              <a:ea typeface="+mj-ea"/>
+              <a:cs typeface="+mj-cs"/>
+            </a:endParaRPr>
+          </a:p>
+        </p:txBody>
+      </p:sp>
+      <p:sp>
+        <p:nvSpPr>
+          <p:cNvPr id="27" name="Rectangle 26">
+            <a:extLst>
+              <a:ext uri="{FF2B5EF4-FFF2-40B4-BE49-F238E27FC236}">
+                <a16:creationId xmlns:a16="http://schemas.microsoft.com/office/drawing/2014/main" id="{AF2F604E-43BE-4DC3-B983-E071523364F8}"/>
+              </a:ext>
+              <a:ext uri="{C183D7F6-B498-43B3-948B-1728B52AA6E4}">
+                <adec:decorative xmlns:adec="http://schemas.microsoft.com/office/drawing/2017/decorative" val="1"/>
+              </a:ext>
+            </a:extLst>
+          </p:cNvPr>
+          <p:cNvSpPr>
+            <a:spLocks noGrp="1" noRot="1" noChangeAspect="1" noMove="1" noResize="1" noEditPoints="1" noAdjustHandles="1" noChangeArrowheads="1" noChangeShapeType="1" noTextEdit="1"/>
+          </p:cNvSpPr>
+          <p:nvPr>
+            <p:extLst>
+              <p:ext uri="{386F3935-93C4-4BCD-93E2-E3B085C9AB24}">
+                <p16:designElem xmlns:p16="http://schemas.microsoft.com/office/powerpoint/2015/main" val="1"/>
+              </p:ext>
+            </p:extLst>
+          </p:nvPr>
+        </p:nvSpPr>
+        <p:spPr>
+          <a:xfrm rot="5400000">
+            <a:off x="759921" y="346791"/>
+            <a:ext cx="146304" cy="704088"/>
+          </a:xfrm>
+          <a:prstGeom prst="rect">
+            <a:avLst/>
+          </a:prstGeom>
+          <a:solidFill>
+            <a:schemeClr val="accent2"/>
+          </a:solidFill>
+          <a:ln>
+            <a:noFill/>
+          </a:ln>
+        </p:spPr>
+        <p:style>
+          <a:lnRef idx="2">
+            <a:schemeClr val="accent1">
+              <a:shade val="50000"/>
+            </a:schemeClr>
+          </a:lnRef>
+          <a:fillRef idx="1">
+            <a:schemeClr val="accent1"/>
+          </a:fillRef>
+          <a:effectRef idx="0">
+            <a:schemeClr val="accent1"/>
+          </a:effectRef>
+          <a:fontRef idx="minor">
+            <a:schemeClr val="lt1"/>
+          </a:fontRef>
+        </p:style>
+        <p:txBody>
+          <a:bodyPr rtlCol="0" anchor="ctr"/>
+          <a:lstStyle/>
+          <a:p>
+            <a:pPr algn="ctr"/>
+            <a:endParaRPr lang="en-US">
+              <a:solidFill>
+                <a:prstClr val="white"/>
+              </a:solidFill>
+              <a:latin typeface="Calibri" panose="020F0502020204030204"/>
+            </a:endParaRPr>
+          </a:p>
+        </p:txBody>
+      </p:sp>
+      <p:sp>
+        <p:nvSpPr>
+          <p:cNvPr id="29" name="Rectangle 28">
+            <a:extLst>
+              <a:ext uri="{FF2B5EF4-FFF2-40B4-BE49-F238E27FC236}">
+                <a16:creationId xmlns:a16="http://schemas.microsoft.com/office/drawing/2014/main" id="{08C9B587-E65E-4B52-B37C-ABEBB6E87928}"/>
+              </a:ext>
+              <a:ext uri="{C183D7F6-B498-43B3-948B-1728B52AA6E4}">
+                <adec:decorative xmlns:adec="http://schemas.microsoft.com/office/drawing/2017/decorative" val="1"/>
+              </a:ext>
+            </a:extLst>
+          </p:cNvPr>
+          <p:cNvSpPr>
+            <a:spLocks noGrp="1" noRot="1" noChangeAspect="1" noMove="1" noResize="1" noEditPoints="1" noAdjustHandles="1" noChangeArrowheads="1" noChangeShapeType="1" noTextEdit="1"/>
+          </p:cNvSpPr>
+          <p:nvPr>
+            <p:extLst>
+              <p:ext uri="{386F3935-93C4-4BCD-93E2-E3B085C9AB24}">
+                <p16:designElem xmlns:p16="http://schemas.microsoft.com/office/powerpoint/2015/main" val="1"/>
+              </p:ext>
+            </p:extLst>
+          </p:nvPr>
+        </p:nvSpPr>
+        <p:spPr>
+          <a:xfrm>
+            <a:off x="481029" y="4546920"/>
+            <a:ext cx="4023360" cy="18288"/>
+          </a:xfrm>
+          <a:prstGeom prst="rect">
+            <a:avLst/>
+          </a:prstGeom>
+          <a:solidFill>
+            <a:srgbClr val="D5D5D5"/>
+          </a:solidFill>
+          <a:ln w="3175">
+            <a:noFill/>
+          </a:ln>
+          <a:effectLst/>
+        </p:spPr>
+        <p:style>
+          <a:lnRef idx="2">
+            <a:schemeClr val="accent1">
+              <a:shade val="50000"/>
+            </a:schemeClr>
+          </a:lnRef>
+          <a:fillRef idx="1">
+            <a:schemeClr val="accent1"/>
+          </a:fillRef>
+          <a:effectRef idx="0">
+            <a:schemeClr val="accent1"/>
+          </a:effectRef>
+          <a:fontRef idx="minor">
+            <a:schemeClr val="lt1"/>
+          </a:fontRef>
+        </p:style>
+        <p:txBody>
+          <a:bodyPr rtlCol="0" anchor="ctr"/>
+          <a:lstStyle/>
+          <a:p>
+            <a:pPr marL="0" marR="0" lvl="0" indent="0" algn="ctr" defTabSz="914400" rtl="0" eaLnBrk="1" fontAlgn="auto" latinLnBrk="0" hangingPunct="1">
+              <a:lnSpc>
+                <a:spcPct val="100000"/>
+              </a:lnSpc>
+              <a:spcBef>
+                <a:spcPts val="0"/>
+              </a:spcBef>
+              <a:spcAft>
+                <a:spcPts val="0"/>
+              </a:spcAft>
+              <a:buClrTx/>
+              <a:buSzTx/>
+              <a:buFontTx/>
+              <a:buNone/>
+              <a:tabLst/>
+              <a:defRPr/>
+            </a:pPr>
+            <a:endParaRPr kumimoji="0" lang="en-US" sz="1800" b="0" i="0" u="none" strike="noStrike" kern="1200" cap="none" spc="0" normalizeH="0" baseline="0" noProof="0">
+              <a:ln>
+                <a:noFill/>
+              </a:ln>
+              <a:solidFill>
+                <a:prstClr val="white"/>
+              </a:solidFill>
+              <a:effectLst/>
+              <a:uLnTx/>
+              <a:uFillTx/>
+              <a:latin typeface="Calibri" panose="020F0502020204030204"/>
+              <a:ea typeface="+mn-ea"/>
+              <a:cs typeface="+mn-cs"/>
+            </a:endParaRPr>
+          </a:p>
+        </p:txBody>
+      </p:sp>
+      <p:pic>
+        <p:nvPicPr>
+          <p:cNvPr id="7" name="Picture 6">
+            <a:extLst>
+              <a:ext uri="{FF2B5EF4-FFF2-40B4-BE49-F238E27FC236}">
+                <a16:creationId xmlns:a16="http://schemas.microsoft.com/office/drawing/2014/main" id="{12770180-54EF-6F63-FAA4-0C6B04EAD429}"/>
+              </a:ext>
+            </a:extLst>
+          </p:cNvPr>
+          <p:cNvPicPr>
+            <a:picLocks noChangeAspect="1"/>
+          </p:cNvPicPr>
+          <p:nvPr/>
+        </p:nvPicPr>
+        <p:blipFill>
+          <a:blip r:embed="rId2"/>
+          <a:stretch>
+            <a:fillRect/>
+          </a:stretch>
+        </p:blipFill>
+        <p:spPr>
+          <a:xfrm>
+            <a:off x="5414356" y="632919"/>
+            <a:ext cx="6408836" cy="5440910"/>
+          </a:xfrm>
+          <a:prstGeom prst="rect">
+            <a:avLst/>
+          </a:prstGeom>
+        </p:spPr>
+      </p:pic>
+    </p:spTree>
+    <p:extLst>
+      <p:ext uri="{BB962C8B-B14F-4D97-AF65-F5344CB8AC3E}">
+        <p14:creationId xmlns:p14="http://schemas.microsoft.com/office/powerpoint/2010/main" val="2754438370"/>
+      </p:ext>
+    </p:extLst>
+  </p:cSld>
+  <p:clrMapOvr>
+    <a:masterClrMapping/>
+  </p:clrMapOvr>
+</p:sld>
+</file>
+
+<file path=ppt/slides/slide18.xml><?xml version="1.0" encoding="utf-8"?>
+<p:sld xmlns:a="http://schemas.openxmlformats.org/drawingml/2006/main" xmlns:r="http://schemas.openxmlformats.org/officeDocument/2006/relationships" xmlns:p="http://schemas.openxmlformats.org/presentationml/2006/main">
+  <p:cSld>
+    <p:spTree>
+      <p:nvGrpSpPr>
+        <p:cNvPr id="1" name="">
+          <a:extLst>
+            <a:ext uri="{FF2B5EF4-FFF2-40B4-BE49-F238E27FC236}">
+              <a16:creationId xmlns:a16="http://schemas.microsoft.com/office/drawing/2014/main" id="{16B66741-96CA-5FEA-0AAB-D087B8EEC062}"/>
+            </a:ext>
+          </a:extLst>
+        </p:cNvPr>
+        <p:cNvGrpSpPr/>
+        <p:nvPr/>
+      </p:nvGrpSpPr>
+      <p:grpSpPr>
+        <a:xfrm>
+          <a:off x="0" y="0"/>
+          <a:ext cx="0" cy="0"/>
+          <a:chOff x="0" y="0"/>
+          <a:chExt cx="0" cy="0"/>
+        </a:xfrm>
+      </p:grpSpPr>
+      <p:sp>
+        <p:nvSpPr>
+          <p:cNvPr id="2" name="Title 1">
+            <a:extLst>
+              <a:ext uri="{FF2B5EF4-FFF2-40B4-BE49-F238E27FC236}">
+                <a16:creationId xmlns:a16="http://schemas.microsoft.com/office/drawing/2014/main" id="{4F34BA8B-40F6-238F-434C-FA589EC13D85}"/>
+              </a:ext>
+            </a:extLst>
+          </p:cNvPr>
+          <p:cNvSpPr>
+            <a:spLocks noGrp="1"/>
+          </p:cNvSpPr>
+          <p:nvPr>
+            <p:ph type="title"/>
+          </p:nvPr>
+        </p:nvSpPr>
+        <p:spPr>
+          <a:xfrm>
+            <a:off x="1115568" y="548640"/>
+            <a:ext cx="10168128" cy="1179576"/>
+          </a:xfrm>
+        </p:spPr>
+        <p:txBody>
+          <a:bodyPr>
+            <a:normAutofit/>
+          </a:bodyPr>
+          <a:lstStyle/>
+          <a:p>
+            <a:pPr algn="ctr"/>
+            <a:r>
+              <a:rPr lang="en-US" sz="2800" b="1" dirty="0"/>
+              <a:t>Evaluator</a:t>
+            </a:r>
+            <a:br>
+              <a:rPr lang="en-US" sz="3700" dirty="0"/>
+            </a:br>
+            <a:r>
+              <a:rPr lang="en-US" sz="3700" dirty="0">
+                <a:solidFill>
+                  <a:srgbClr val="FF0000"/>
+                </a:solidFill>
+              </a:rPr>
+              <a:t>Online-Mind2Web</a:t>
+            </a:r>
+          </a:p>
+        </p:txBody>
+      </p:sp>
+      <p:sp>
+        <p:nvSpPr>
+          <p:cNvPr id="3" name="Content Placeholder 2">
+            <a:extLst>
+              <a:ext uri="{FF2B5EF4-FFF2-40B4-BE49-F238E27FC236}">
+                <a16:creationId xmlns:a16="http://schemas.microsoft.com/office/drawing/2014/main" id="{69FE8D42-28AE-4D3F-BBD2-9100C8DC0C72}"/>
+              </a:ext>
+            </a:extLst>
+          </p:cNvPr>
+          <p:cNvSpPr>
+            <a:spLocks noGrp="1"/>
+          </p:cNvSpPr>
+          <p:nvPr>
+            <p:ph idx="1"/>
+          </p:nvPr>
+        </p:nvSpPr>
+        <p:spPr>
+          <a:xfrm>
+            <a:off x="1115568" y="2147647"/>
+            <a:ext cx="10168128" cy="3695020"/>
+          </a:xfrm>
+        </p:spPr>
+        <p:txBody>
+          <a:bodyPr>
+            <a:normAutofit/>
+          </a:bodyPr>
+          <a:lstStyle/>
+          <a:p>
+            <a:r>
+              <a:rPr lang="en-US" sz="2200" dirty="0" err="1"/>
+              <a:t>WebJudge</a:t>
+            </a:r>
+            <a:endParaRPr lang="en-US" sz="2200" dirty="0"/>
+          </a:p>
+          <a:p>
+            <a:pPr marL="457200" lvl="1" indent="0">
+              <a:buNone/>
+            </a:pPr>
+            <a:r>
+              <a:rPr lang="en-US" sz="1800" dirty="0"/>
+              <a:t>1. Key Point Identification </a:t>
+            </a:r>
+          </a:p>
+          <a:p>
+            <a:pPr marL="457200" lvl="1" indent="0">
+              <a:buNone/>
+            </a:pPr>
+            <a:r>
+              <a:rPr lang="en-US" sz="1800" dirty="0"/>
+              <a:t>2. Key Screenshot Identification</a:t>
+            </a:r>
+          </a:p>
+          <a:p>
+            <a:pPr marL="457200" lvl="1" indent="0">
+              <a:buNone/>
+            </a:pPr>
+            <a:r>
+              <a:rPr lang="en-US" sz="1800" dirty="0"/>
+              <a:t>3. Outcome Judgement </a:t>
+            </a:r>
+          </a:p>
+          <a:p>
+            <a:pPr marL="457200" lvl="1" indent="0">
+              <a:buNone/>
+            </a:pPr>
+            <a:endParaRPr lang="en-US" sz="1800" dirty="0"/>
+          </a:p>
+          <a:p>
+            <a:pPr marL="0" indent="0">
+              <a:buNone/>
+            </a:pPr>
+            <a:r>
+              <a:rPr lang="en-US" sz="2200" dirty="0"/>
+              <a:t>		</a:t>
+            </a:r>
+            <a:r>
+              <a:rPr lang="pt-BR" sz="2000" b="1" dirty="0"/>
+              <a:t>O = Evaluator(T, A, I)</a:t>
+            </a:r>
+          </a:p>
+          <a:p>
+            <a:pPr marL="0" indent="0">
+              <a:buNone/>
+            </a:pPr>
+            <a:r>
+              <a:rPr lang="pt-BR" sz="2000" b="1" dirty="0"/>
+              <a:t>	T: Task</a:t>
+            </a:r>
+          </a:p>
+          <a:p>
+            <a:pPr marL="0" indent="0">
+              <a:buNone/>
+            </a:pPr>
+            <a:r>
+              <a:rPr lang="pt-BR" sz="2000" b="1" dirty="0"/>
+              <a:t>	A: Actions (a_0, a_1, ..., a_n)</a:t>
+            </a:r>
+          </a:p>
+          <a:p>
+            <a:pPr marL="0" indent="0">
+              <a:buNone/>
+            </a:pPr>
+            <a:r>
+              <a:rPr lang="pt-BR" sz="2000" b="1" dirty="0"/>
+              <a:t>	I: images (i_1, i_2, ..., i_n)</a:t>
+            </a:r>
+          </a:p>
+          <a:p>
+            <a:pPr marL="0" indent="0">
+              <a:buNone/>
+            </a:pPr>
+            <a:endParaRPr lang="en-US" sz="1800" b="1" dirty="0"/>
+          </a:p>
+        </p:txBody>
+      </p:sp>
+    </p:spTree>
+    <p:extLst>
+      <p:ext uri="{BB962C8B-B14F-4D97-AF65-F5344CB8AC3E}">
+        <p14:creationId xmlns:p14="http://schemas.microsoft.com/office/powerpoint/2010/main" val="450051479"/>
+      </p:ext>
+    </p:extLst>
+  </p:cSld>
+  <p:clrMapOvr>
+    <a:masterClrMapping/>
+  </p:clrMapOvr>
+</p:sld>
+</file>
+
+<file path=ppt/slides/slide19.xml><?xml version="1.0" encoding="utf-8"?>
+<p:sld xmlns:a="http://schemas.openxmlformats.org/drawingml/2006/main" xmlns:r="http://schemas.openxmlformats.org/officeDocument/2006/relationships" xmlns:p="http://schemas.openxmlformats.org/presentationml/2006/main">
+  <p:cSld>
+    <p:spTree>
+      <p:nvGrpSpPr>
+        <p:cNvPr id="1" name="">
+          <a:extLst>
+            <a:ext uri="{FF2B5EF4-FFF2-40B4-BE49-F238E27FC236}">
+              <a16:creationId xmlns:a16="http://schemas.microsoft.com/office/drawing/2014/main" id="{2D17E5EF-A0E8-C163-3525-2DC01180682D}"/>
+            </a:ext>
+          </a:extLst>
+        </p:cNvPr>
+        <p:cNvGrpSpPr/>
+        <p:nvPr/>
+      </p:nvGrpSpPr>
+      <p:grpSpPr>
+        <a:xfrm>
+          <a:off x="0" y="0"/>
+          <a:ext cx="0" cy="0"/>
+          <a:chOff x="0" y="0"/>
+          <a:chExt cx="0" cy="0"/>
+        </a:xfrm>
+      </p:grpSpPr>
+      <p:sp>
+        <p:nvSpPr>
+          <p:cNvPr id="2" name="Title 1">
+            <a:extLst>
+              <a:ext uri="{FF2B5EF4-FFF2-40B4-BE49-F238E27FC236}">
+                <a16:creationId xmlns:a16="http://schemas.microsoft.com/office/drawing/2014/main" id="{113CAECB-D68C-B32F-9496-425B992DC0BA}"/>
+              </a:ext>
+            </a:extLst>
+          </p:cNvPr>
+          <p:cNvSpPr>
+            <a:spLocks noGrp="1"/>
+          </p:cNvSpPr>
+          <p:nvPr>
+            <p:ph type="title"/>
+          </p:nvPr>
+        </p:nvSpPr>
+        <p:spPr>
+          <a:xfrm>
+            <a:off x="1176528" y="142240"/>
+            <a:ext cx="10168128" cy="1179576"/>
+          </a:xfrm>
+        </p:spPr>
+        <p:txBody>
+          <a:bodyPr>
+            <a:normAutofit/>
+          </a:bodyPr>
+          <a:lstStyle/>
+          <a:p>
+            <a:pPr algn="ctr"/>
+            <a:r>
+              <a:rPr lang="en-US" sz="2800" b="1" dirty="0"/>
+              <a:t>Evaluator</a:t>
+            </a:r>
+            <a:br>
+              <a:rPr lang="en-US" sz="3700" dirty="0"/>
+            </a:br>
+            <a:r>
+              <a:rPr lang="en-US" sz="3700" dirty="0">
+                <a:solidFill>
+                  <a:srgbClr val="FF0000"/>
+                </a:solidFill>
+              </a:rPr>
+              <a:t>Online-Mind2Web</a:t>
+            </a:r>
+          </a:p>
+        </p:txBody>
+      </p:sp>
+      <p:pic>
+        <p:nvPicPr>
+          <p:cNvPr id="6" name="Picture 5">
+            <a:extLst>
+              <a:ext uri="{FF2B5EF4-FFF2-40B4-BE49-F238E27FC236}">
+                <a16:creationId xmlns:a16="http://schemas.microsoft.com/office/drawing/2014/main" id="{9AF1C60F-1986-97F3-F4A2-8FB2A409B60E}"/>
+              </a:ext>
+            </a:extLst>
+          </p:cNvPr>
+          <p:cNvPicPr>
+            <a:picLocks noChangeAspect="1"/>
+          </p:cNvPicPr>
+          <p:nvPr/>
+        </p:nvPicPr>
+        <p:blipFill>
+          <a:blip r:embed="rId2"/>
+          <a:stretch>
+            <a:fillRect/>
+          </a:stretch>
+        </p:blipFill>
+        <p:spPr>
+          <a:xfrm>
+            <a:off x="1901019" y="1691509"/>
+            <a:ext cx="7870492" cy="4722293"/>
+          </a:xfrm>
+          <a:prstGeom prst="rect">
+            <a:avLst/>
+          </a:prstGeom>
+        </p:spPr>
+      </p:pic>
+    </p:spTree>
+    <p:extLst>
+      <p:ext uri="{BB962C8B-B14F-4D97-AF65-F5344CB8AC3E}">
+        <p14:creationId xmlns:p14="http://schemas.microsoft.com/office/powerpoint/2010/main" val="1507924237"/>
+      </p:ext>
+    </p:extLst>
+  </p:cSld>
+  <p:clrMapOvr>
+    <a:masterClrMapping/>
+  </p:clrMapOvr>
+</p:sld>
+</file>
+
 <file path=ppt/slides/slide2.xml><?xml version="1.0" encoding="utf-8"?>
 <p:sld xmlns:a="http://schemas.openxmlformats.org/drawingml/2006/main" xmlns:r="http://schemas.openxmlformats.org/officeDocument/2006/relationships" xmlns:p="http://schemas.openxmlformats.org/presentationml/2006/main">
   <p:cSld>

</xml_diff>